<commit_message>
Updated slide master to match Level 1 course
</commit_message>
<xml_diff>
--- a/ImageJ_FIJI_Macro_Course_Lecture.pptx
+++ b/ImageJ_FIJI_Macro_Course_Lecture.pptx
@@ -2716,6 +2716,42 @@
           <a:chExt cx="0" cy="0"/>
         </a:xfrm>
       </p:grpSpPr>
+      <p:pic>
+        <p:nvPicPr>
+          <p:cNvPr id="2" name="Picture 1" descr="A close up of a sign&#10;&#10;Description automatically generated">
+            <a:extLst>
+              <a:ext uri="{FF2B5EF4-FFF2-40B4-BE49-F238E27FC236}">
+                <a16:creationId xmlns:a16="http://schemas.microsoft.com/office/drawing/2014/main" id="{E9E80C31-C366-4C82-8222-9952A175A4F2}"/>
+              </a:ext>
+            </a:extLst>
+          </p:cNvPr>
+          <p:cNvPicPr>
+            <a:picLocks noChangeAspect="1"/>
+          </p:cNvPicPr>
+          <p:nvPr userDrawn="1"/>
+        </p:nvPicPr>
+        <p:blipFill>
+          <a:blip r:embed="rId8" cstate="print">
+            <a:extLst>
+              <a:ext uri="{28A0092B-C50C-407E-A947-70E740481C1C}">
+                <a14:useLocalDpi xmlns:a14="http://schemas.microsoft.com/office/drawing/2010/main" val="0"/>
+              </a:ext>
+            </a:extLst>
+          </a:blip>
+          <a:stretch>
+            <a:fillRect/>
+          </a:stretch>
+        </p:blipFill>
+        <p:spPr>
+          <a:xfrm>
+            <a:off x="335360" y="198424"/>
+            <a:ext cx="1757570" cy="729826"/>
+          </a:xfrm>
+          <a:prstGeom prst="rect">
+            <a:avLst/>
+          </a:prstGeom>
+        </p:spPr>
+      </p:pic>
       <p:cxnSp>
         <p:nvCxnSpPr>
           <p:cNvPr id="9" name="Straight Connector 8"/>
@@ -2792,114 +2828,45 @@
           </a:fontRef>
         </p:style>
       </p:cxnSp>
-      <p:pic>
-        <p:nvPicPr>
-          <p:cNvPr id="1033" name="Picture 7" descr="logo-ltr.tif"/>
-          <p:cNvPicPr>
-            <a:picLocks noChangeAspect="1"/>
-          </p:cNvPicPr>
-          <p:nvPr/>
-        </p:nvPicPr>
-        <p:blipFill>
-          <a:blip r:embed="rId8" cstate="screen">
+      <p:sp>
+        <p:nvSpPr>
+          <p:cNvPr id="3" name="Rectangle 2">
             <a:extLst>
-              <a:ext uri="{28A0092B-C50C-407E-A947-70E740481C1C}">
-                <a14:useLocalDpi xmlns:a14="http://schemas.microsoft.com/office/drawing/2010/main"/>
+              <a:ext uri="{FF2B5EF4-FFF2-40B4-BE49-F238E27FC236}">
+                <a16:creationId xmlns:a16="http://schemas.microsoft.com/office/drawing/2014/main" id="{DF8F419D-650E-4C8E-8038-42C07C1D4193}"/>
               </a:ext>
             </a:extLst>
-          </a:blip>
-          <a:srcRect/>
-          <a:stretch>
-            <a:fillRect/>
-          </a:stretch>
-        </p:blipFill>
-        <p:spPr bwMode="auto">
+          </p:cNvPr>
+          <p:cNvSpPr/>
+          <p:nvPr userDrawn="1"/>
+        </p:nvSpPr>
+        <p:spPr>
           <a:xfrm>
-            <a:off x="334963" y="285750"/>
-            <a:ext cx="1944687" cy="563563"/>
+            <a:off x="8292496" y="6281806"/>
+            <a:ext cx="3703258" cy="400110"/>
           </a:xfrm>
           <a:prstGeom prst="rect">
             <a:avLst/>
           </a:prstGeom>
-          <a:noFill/>
-          <a:ln>
-            <a:noFill/>
-          </a:ln>
-          <a:extLst>
-            <a:ext uri="{909E8E84-426E-40DD-AFC4-6F175D3DCCD1}">
-              <a14:hiddenFill xmlns:a14="http://schemas.microsoft.com/office/drawing/2010/main">
-                <a:solidFill>
-                  <a:srgbClr val="FFFFFF"/>
-                </a:solidFill>
-              </a14:hiddenFill>
-            </a:ext>
-            <a:ext uri="{91240B29-F687-4F45-9708-019B960494DF}">
-              <a14:hiddenLine xmlns:a14="http://schemas.microsoft.com/office/drawing/2010/main" w="9525">
-                <a:solidFill>
-                  <a:srgbClr val="000000"/>
-                </a:solidFill>
-                <a:miter lim="800000"/>
-                <a:headEnd/>
-                <a:tailEnd/>
-              </a14:hiddenLine>
-            </a:ext>
-          </a:extLst>
         </p:spPr>
-      </p:pic>
-      <p:pic>
-        <p:nvPicPr>
-          <p:cNvPr id="1034" name="Picture 11" descr="address.gif"/>
-          <p:cNvPicPr>
-            <a:picLocks noChangeAspect="1"/>
-          </p:cNvPicPr>
-          <p:nvPr/>
-        </p:nvPicPr>
-        <p:blipFill>
-          <a:blip r:embed="rId9" cstate="screen">
-            <a:extLst>
-              <a:ext uri="{28A0092B-C50C-407E-A947-70E740481C1C}">
-                <a14:useLocalDpi xmlns:a14="http://schemas.microsoft.com/office/drawing/2010/main"/>
-              </a:ext>
-            </a:extLst>
-          </a:blip>
-          <a:srcRect/>
-          <a:stretch>
-            <a:fillRect/>
-          </a:stretch>
-        </p:blipFill>
-        <p:spPr bwMode="auto">
-          <a:xfrm>
-            <a:off x="10364788" y="6237288"/>
-            <a:ext cx="1492250" cy="342900"/>
-          </a:xfrm>
-          <a:prstGeom prst="rect">
-            <a:avLst/>
-          </a:prstGeom>
-          <a:noFill/>
-          <a:ln>
-            <a:noFill/>
-          </a:ln>
-          <a:extLst>
-            <a:ext uri="{909E8E84-426E-40DD-AFC4-6F175D3DCCD1}">
-              <a14:hiddenFill xmlns:a14="http://schemas.microsoft.com/office/drawing/2010/main">
-                <a:solidFill>
-                  <a:srgbClr val="FFFFFF"/>
-                </a:solidFill>
-              </a14:hiddenFill>
-            </a:ext>
-            <a:ext uri="{91240B29-F687-4F45-9708-019B960494DF}">
-              <a14:hiddenLine xmlns:a14="http://schemas.microsoft.com/office/drawing/2010/main" w="9525">
-                <a:solidFill>
-                  <a:srgbClr val="000000"/>
-                </a:solidFill>
-                <a:miter lim="800000"/>
-                <a:headEnd/>
-                <a:tailEnd/>
-              </a14:hiddenLine>
-            </a:ext>
-          </a:extLst>
-        </p:spPr>
-      </p:pic>
+        <p:txBody>
+          <a:bodyPr wrap="none">
+            <a:spAutoFit/>
+          </a:bodyPr>
+          <a:lstStyle/>
+          <a:p>
+            <a:r>
+              <a:rPr lang="en-GB" sz="2000" dirty="0">
+                <a:solidFill>
+                  <a:srgbClr val="7F7F7F"/>
+                </a:solidFill>
+                <a:latin typeface="Arial Nova Light" panose="020B0304020202020204" pitchFamily="34" charset="0"/>
+              </a:rPr>
+              <a:t>bristol.ac.uk/wolfson-bioimaging</a:t>
+            </a:r>
+          </a:p>
+        </p:txBody>
+      </p:sp>
     </p:spTree>
     <p:extLst>
       <p:ext uri="{BB962C8B-B14F-4D97-AF65-F5344CB8AC3E}">

</xml_diff>

<commit_message>
Final modifications for YouTube video
</commit_message>
<xml_diff>
--- a/ImageJ_FIJI_Macro_Course_Lecture.pptx
+++ b/ImageJ_FIJI_Macro_Course_Lecture.pptx
@@ -5,10 +5,10 @@
     <p:sldMasterId id="2147483678" r:id="rId1"/>
   </p:sldMasterIdLst>
   <p:notesMasterIdLst>
-    <p:notesMasterId r:id="rId44"/>
+    <p:notesMasterId r:id="rId45"/>
   </p:notesMasterIdLst>
   <p:handoutMasterIdLst>
-    <p:handoutMasterId r:id="rId45"/>
+    <p:handoutMasterId r:id="rId46"/>
   </p:handoutMasterIdLst>
   <p:sldIdLst>
     <p:sldId id="316" r:id="rId2"/>
@@ -53,6 +53,7 @@
     <p:sldId id="354" r:id="rId41"/>
     <p:sldId id="362" r:id="rId42"/>
     <p:sldId id="363" r:id="rId43"/>
+    <p:sldId id="374" r:id="rId44"/>
   </p:sldIdLst>
   <p:sldSz cx="12192000" cy="6858000"/>
   <p:notesSz cx="6669088" cy="9872663"/>
@@ -544,7 +545,7 @@
     </p:spTree>
     <p:extLst>
       <p:ext uri="{BB962C8B-B14F-4D97-AF65-F5344CB8AC3E}">
-        <p14:creationId xmlns:p14="http://schemas.microsoft.com/office/powerpoint/2010/main" val="3900527741"/>
+        <p14:creationId xmlns:p14="http://schemas.microsoft.com/office/powerpoint/2010/main" val="2099154153"/>
       </p:ext>
     </p:extLst>
   </p:cSld>
@@ -605,7 +606,7 @@
     </p:spTree>
     <p:extLst>
       <p:ext uri="{BB962C8B-B14F-4D97-AF65-F5344CB8AC3E}">
-        <p14:creationId xmlns:p14="http://schemas.microsoft.com/office/powerpoint/2010/main" val="1389528251"/>
+        <p14:creationId xmlns:p14="http://schemas.microsoft.com/office/powerpoint/2010/main" val="1735092702"/>
       </p:ext>
     </p:extLst>
   </p:cSld>
@@ -642,12 +643,7 @@
             <p:ph type="sldImg"/>
           </p:nvPr>
         </p:nvSpPr>
-        <p:spPr>
-          <a:xfrm>
-            <a:off x="44450" y="739775"/>
-            <a:ext cx="6580188" cy="3702050"/>
-          </a:xfrm>
-        </p:spPr>
+        <p:spPr/>
       </p:sp>
       <p:sp>
         <p:nvSpPr>
@@ -671,7 +667,7 @@
     </p:spTree>
     <p:extLst>
       <p:ext uri="{BB962C8B-B14F-4D97-AF65-F5344CB8AC3E}">
-        <p14:creationId xmlns:p14="http://schemas.microsoft.com/office/powerpoint/2010/main" val="908538832"/>
+        <p14:creationId xmlns:p14="http://schemas.microsoft.com/office/powerpoint/2010/main" val="1389528251"/>
       </p:ext>
     </p:extLst>
   </p:cSld>
@@ -737,7 +733,7 @@
     </p:spTree>
     <p:extLst>
       <p:ext uri="{BB962C8B-B14F-4D97-AF65-F5344CB8AC3E}">
-        <p14:creationId xmlns:p14="http://schemas.microsoft.com/office/powerpoint/2010/main" val="2309285193"/>
+        <p14:creationId xmlns:p14="http://schemas.microsoft.com/office/powerpoint/2010/main" val="908538832"/>
       </p:ext>
     </p:extLst>
   </p:cSld>
@@ -803,7 +799,7 @@
     </p:spTree>
     <p:extLst>
       <p:ext uri="{BB962C8B-B14F-4D97-AF65-F5344CB8AC3E}">
-        <p14:creationId xmlns:p14="http://schemas.microsoft.com/office/powerpoint/2010/main" val="830498128"/>
+        <p14:creationId xmlns:p14="http://schemas.microsoft.com/office/powerpoint/2010/main" val="2309285193"/>
       </p:ext>
     </p:extLst>
   </p:cSld>
@@ -869,7 +865,7 @@
     </p:spTree>
     <p:extLst>
       <p:ext uri="{BB962C8B-B14F-4D97-AF65-F5344CB8AC3E}">
-        <p14:creationId xmlns:p14="http://schemas.microsoft.com/office/powerpoint/2010/main" val="6476794"/>
+        <p14:creationId xmlns:p14="http://schemas.microsoft.com/office/powerpoint/2010/main" val="830498128"/>
       </p:ext>
     </p:extLst>
   </p:cSld>
@@ -935,7 +931,7 @@
     </p:spTree>
     <p:extLst>
       <p:ext uri="{BB962C8B-B14F-4D97-AF65-F5344CB8AC3E}">
-        <p14:creationId xmlns:p14="http://schemas.microsoft.com/office/powerpoint/2010/main" val="1528691606"/>
+        <p14:creationId xmlns:p14="http://schemas.microsoft.com/office/powerpoint/2010/main" val="6476794"/>
       </p:ext>
     </p:extLst>
   </p:cSld>
@@ -1001,7 +997,7 @@
     </p:spTree>
     <p:extLst>
       <p:ext uri="{BB962C8B-B14F-4D97-AF65-F5344CB8AC3E}">
-        <p14:creationId xmlns:p14="http://schemas.microsoft.com/office/powerpoint/2010/main" val="2595930090"/>
+        <p14:creationId xmlns:p14="http://schemas.microsoft.com/office/powerpoint/2010/main" val="1528691606"/>
       </p:ext>
     </p:extLst>
   </p:cSld>
@@ -1011,7 +1007,7 @@
 </p:notes>
 </file>
 
-<file path=ppt/notesSlides/notesSlide2.xml><?xml version="1.0" encoding="utf-8"?>
+<file path=ppt/notesSlides/notesSlide17.xml><?xml version="1.0" encoding="utf-8"?>
 <p:notes xmlns:a="http://schemas.openxmlformats.org/drawingml/2006/main" xmlns:r="http://schemas.openxmlformats.org/officeDocument/2006/relationships" xmlns:p="http://schemas.openxmlformats.org/presentationml/2006/main">
   <p:cSld>
     <p:spTree>
@@ -1060,29 +1056,6 @@
           <a:bodyPr/>
           <a:lstStyle/>
           <a:p>
-            <a:pPr marL="0" marR="0" indent="0" defTabSz="457200" eaLnBrk="1" fontAlgn="auto" latinLnBrk="0" hangingPunct="1">
-              <a:lnSpc>
-                <a:spcPct val="125000"/>
-              </a:lnSpc>
-              <a:spcBef>
-                <a:spcPts val="0"/>
-              </a:spcBef>
-              <a:spcAft>
-                <a:spcPts val="0"/>
-              </a:spcAft>
-              <a:buClrTx/>
-              <a:buSzTx/>
-              <a:buFontTx/>
-              <a:buNone/>
-              <a:tabLst/>
-              <a:defRPr/>
-            </a:pPr>
-            <a:r>
-              <a:rPr lang="en-GB" dirty="0"/>
-              <a:t>Why would you want to do this?</a:t>
-            </a:r>
-          </a:p>
-          <a:p>
             <a:endParaRPr lang="en-GB" dirty="0"/>
           </a:p>
         </p:txBody>
@@ -1090,7 +1063,68 @@
     </p:spTree>
     <p:extLst>
       <p:ext uri="{BB962C8B-B14F-4D97-AF65-F5344CB8AC3E}">
-        <p14:creationId xmlns:p14="http://schemas.microsoft.com/office/powerpoint/2010/main" val="505899815"/>
+        <p14:creationId xmlns:p14="http://schemas.microsoft.com/office/powerpoint/2010/main" val="2595930090"/>
+      </p:ext>
+    </p:extLst>
+  </p:cSld>
+  <p:clrMapOvr>
+    <a:masterClrMapping/>
+  </p:clrMapOvr>
+</p:notes>
+</file>
+
+<file path=ppt/notesSlides/notesSlide2.xml><?xml version="1.0" encoding="utf-8"?>
+<p:notes xmlns:a="http://schemas.openxmlformats.org/drawingml/2006/main" xmlns:r="http://schemas.openxmlformats.org/officeDocument/2006/relationships" xmlns:p="http://schemas.openxmlformats.org/presentationml/2006/main">
+  <p:cSld>
+    <p:spTree>
+      <p:nvGrpSpPr>
+        <p:cNvPr id="1" name=""/>
+        <p:cNvGrpSpPr/>
+        <p:nvPr/>
+      </p:nvGrpSpPr>
+      <p:grpSpPr>
+        <a:xfrm>
+          <a:off x="0" y="0"/>
+          <a:ext cx="0" cy="0"/>
+          <a:chOff x="0" y="0"/>
+          <a:chExt cx="0" cy="0"/>
+        </a:xfrm>
+      </p:grpSpPr>
+      <p:sp>
+        <p:nvSpPr>
+          <p:cNvPr id="2" name="Slide Image Placeholder 1"/>
+          <p:cNvSpPr>
+            <a:spLocks noGrp="1" noRot="1" noChangeAspect="1"/>
+          </p:cNvSpPr>
+          <p:nvPr>
+            <p:ph type="sldImg"/>
+          </p:nvPr>
+        </p:nvSpPr>
+        <p:spPr/>
+      </p:sp>
+      <p:sp>
+        <p:nvSpPr>
+          <p:cNvPr id="3" name="Notes Placeholder 2"/>
+          <p:cNvSpPr>
+            <a:spLocks noGrp="1"/>
+          </p:cNvSpPr>
+          <p:nvPr>
+            <p:ph type="body" idx="1"/>
+          </p:nvPr>
+        </p:nvSpPr>
+        <p:spPr/>
+        <p:txBody>
+          <a:bodyPr/>
+          <a:lstStyle/>
+          <a:p>
+            <a:endParaRPr lang="en-GB" dirty="0"/>
+          </a:p>
+        </p:txBody>
+      </p:sp>
+    </p:spTree>
+    <p:extLst>
+      <p:ext uri="{BB962C8B-B14F-4D97-AF65-F5344CB8AC3E}">
+        <p14:creationId xmlns:p14="http://schemas.microsoft.com/office/powerpoint/2010/main" val="3900527741"/>
       </p:ext>
     </p:extLst>
   </p:cSld>
@@ -1149,6 +1183,29 @@
           <a:bodyPr/>
           <a:lstStyle/>
           <a:p>
+            <a:pPr marL="0" marR="0" indent="0" defTabSz="457200" eaLnBrk="1" fontAlgn="auto" latinLnBrk="0" hangingPunct="1">
+              <a:lnSpc>
+                <a:spcPct val="125000"/>
+              </a:lnSpc>
+              <a:spcBef>
+                <a:spcPts val="0"/>
+              </a:spcBef>
+              <a:spcAft>
+                <a:spcPts val="0"/>
+              </a:spcAft>
+              <a:buClrTx/>
+              <a:buSzTx/>
+              <a:buFontTx/>
+              <a:buNone/>
+              <a:tabLst/>
+              <a:defRPr/>
+            </a:pPr>
+            <a:r>
+              <a:rPr lang="en-GB" dirty="0"/>
+              <a:t>Why would you want to do this?</a:t>
+            </a:r>
+          </a:p>
+          <a:p>
             <a:endParaRPr lang="en-GB" dirty="0"/>
           </a:p>
         </p:txBody>
@@ -1156,7 +1213,7 @@
     </p:spTree>
     <p:extLst>
       <p:ext uri="{BB962C8B-B14F-4D97-AF65-F5344CB8AC3E}">
-        <p14:creationId xmlns:p14="http://schemas.microsoft.com/office/powerpoint/2010/main" val="750402275"/>
+        <p14:creationId xmlns:p14="http://schemas.microsoft.com/office/powerpoint/2010/main" val="505899815"/>
       </p:ext>
     </p:extLst>
   </p:cSld>
@@ -1222,7 +1279,7 @@
     </p:spTree>
     <p:extLst>
       <p:ext uri="{BB962C8B-B14F-4D97-AF65-F5344CB8AC3E}">
-        <p14:creationId xmlns:p14="http://schemas.microsoft.com/office/powerpoint/2010/main" val="696826082"/>
+        <p14:creationId xmlns:p14="http://schemas.microsoft.com/office/powerpoint/2010/main" val="750402275"/>
       </p:ext>
     </p:extLst>
   </p:cSld>
@@ -1288,7 +1345,7 @@
     </p:spTree>
     <p:extLst>
       <p:ext uri="{BB962C8B-B14F-4D97-AF65-F5344CB8AC3E}">
-        <p14:creationId xmlns:p14="http://schemas.microsoft.com/office/powerpoint/2010/main" val="2188351043"/>
+        <p14:creationId xmlns:p14="http://schemas.microsoft.com/office/powerpoint/2010/main" val="696826082"/>
       </p:ext>
     </p:extLst>
   </p:cSld>
@@ -1354,7 +1411,7 @@
     </p:spTree>
     <p:extLst>
       <p:ext uri="{BB962C8B-B14F-4D97-AF65-F5344CB8AC3E}">
-        <p14:creationId xmlns:p14="http://schemas.microsoft.com/office/powerpoint/2010/main" val="3867494107"/>
+        <p14:creationId xmlns:p14="http://schemas.microsoft.com/office/powerpoint/2010/main" val="2188351043"/>
       </p:ext>
     </p:extLst>
   </p:cSld>
@@ -1420,7 +1477,7 @@
     </p:spTree>
     <p:extLst>
       <p:ext uri="{BB962C8B-B14F-4D97-AF65-F5344CB8AC3E}">
-        <p14:creationId xmlns:p14="http://schemas.microsoft.com/office/powerpoint/2010/main" val="2806393665"/>
+        <p14:creationId xmlns:p14="http://schemas.microsoft.com/office/powerpoint/2010/main" val="3867494107"/>
       </p:ext>
     </p:extLst>
   </p:cSld>
@@ -1486,7 +1543,7 @@
     </p:spTree>
     <p:extLst>
       <p:ext uri="{BB962C8B-B14F-4D97-AF65-F5344CB8AC3E}">
-        <p14:creationId xmlns:p14="http://schemas.microsoft.com/office/powerpoint/2010/main" val="3967492526"/>
+        <p14:creationId xmlns:p14="http://schemas.microsoft.com/office/powerpoint/2010/main" val="2806393665"/>
       </p:ext>
     </p:extLst>
   </p:cSld>
@@ -1523,7 +1580,12 @@
             <p:ph type="sldImg"/>
           </p:nvPr>
         </p:nvSpPr>
-        <p:spPr/>
+        <p:spPr>
+          <a:xfrm>
+            <a:off x="44450" y="739775"/>
+            <a:ext cx="6580188" cy="3702050"/>
+          </a:xfrm>
+        </p:spPr>
       </p:sp>
       <p:sp>
         <p:nvSpPr>
@@ -1547,7 +1609,7 @@
     </p:spTree>
     <p:extLst>
       <p:ext uri="{BB962C8B-B14F-4D97-AF65-F5344CB8AC3E}">
-        <p14:creationId xmlns:p14="http://schemas.microsoft.com/office/powerpoint/2010/main" val="1735092702"/>
+        <p14:creationId xmlns:p14="http://schemas.microsoft.com/office/powerpoint/2010/main" val="3967492526"/>
       </p:ext>
     </p:extLst>
   </p:cSld>
@@ -1810,60 +1872,6 @@
           </a:p>
         </p:txBody>
       </p:sp>
-      <p:pic>
-        <p:nvPicPr>
-          <p:cNvPr id="7" name="Picture 11"/>
-          <p:cNvPicPr>
-            <a:picLocks noChangeAspect="1"/>
-          </p:cNvPicPr>
-          <p:nvPr userDrawn="1"/>
-        </p:nvPicPr>
-        <p:blipFill>
-          <a:blip r:embed="rId2" cstate="screen">
-            <a:extLst>
-              <a:ext uri="{28A0092B-C50C-407E-A947-70E740481C1C}">
-                <a14:useLocalDpi xmlns:a14="http://schemas.microsoft.com/office/drawing/2010/main"/>
-              </a:ext>
-            </a:extLst>
-          </a:blip>
-          <a:srcRect/>
-          <a:stretch>
-            <a:fillRect/>
-          </a:stretch>
-        </p:blipFill>
-        <p:spPr bwMode="auto">
-          <a:xfrm>
-            <a:off x="11137503" y="123980"/>
-            <a:ext cx="719137" cy="858837"/>
-          </a:xfrm>
-          <a:prstGeom prst="rect">
-            <a:avLst/>
-          </a:prstGeom>
-          <a:noFill/>
-          <a:ln>
-            <a:noFill/>
-          </a:ln>
-          <a:extLst>
-            <a:ext uri="{909E8E84-426E-40DD-AFC4-6F175D3DCCD1}">
-              <a14:hiddenFill xmlns:a14="http://schemas.microsoft.com/office/drawing/2010/main">
-                <a:solidFill>
-                  <a:srgbClr val="FFFFFF"/>
-                </a:solidFill>
-              </a14:hiddenFill>
-            </a:ext>
-            <a:ext uri="{91240B29-F687-4F45-9708-019B960494DF}">
-              <a14:hiddenLine xmlns:a14="http://schemas.microsoft.com/office/drawing/2010/main" w="9525">
-                <a:solidFill>
-                  <a:srgbClr val="000000"/>
-                </a:solidFill>
-                <a:miter lim="800000"/>
-                <a:headEnd/>
-                <a:tailEnd/>
-              </a14:hiddenLine>
-            </a:ext>
-          </a:extLst>
-        </p:spPr>
-      </p:pic>
       <p:sp>
         <p:nvSpPr>
           <p:cNvPr id="8" name="Content Placeholder 2"/>
@@ -2049,60 +2057,6 @@
           </a:p>
         </p:txBody>
       </p:sp>
-      <p:pic>
-        <p:nvPicPr>
-          <p:cNvPr id="4" name="Picture 11"/>
-          <p:cNvPicPr>
-            <a:picLocks noChangeAspect="1"/>
-          </p:cNvPicPr>
-          <p:nvPr userDrawn="1"/>
-        </p:nvPicPr>
-        <p:blipFill>
-          <a:blip r:embed="rId2" cstate="screen">
-            <a:extLst>
-              <a:ext uri="{28A0092B-C50C-407E-A947-70E740481C1C}">
-                <a14:useLocalDpi xmlns:a14="http://schemas.microsoft.com/office/drawing/2010/main"/>
-              </a:ext>
-            </a:extLst>
-          </a:blip>
-          <a:srcRect/>
-          <a:stretch>
-            <a:fillRect/>
-          </a:stretch>
-        </p:blipFill>
-        <p:spPr bwMode="auto">
-          <a:xfrm>
-            <a:off x="11137503" y="123980"/>
-            <a:ext cx="719137" cy="858837"/>
-          </a:xfrm>
-          <a:prstGeom prst="rect">
-            <a:avLst/>
-          </a:prstGeom>
-          <a:noFill/>
-          <a:ln>
-            <a:noFill/>
-          </a:ln>
-          <a:extLst>
-            <a:ext uri="{909E8E84-426E-40DD-AFC4-6F175D3DCCD1}">
-              <a14:hiddenFill xmlns:a14="http://schemas.microsoft.com/office/drawing/2010/main">
-                <a:solidFill>
-                  <a:srgbClr val="FFFFFF"/>
-                </a:solidFill>
-              </a14:hiddenFill>
-            </a:ext>
-            <a:ext uri="{91240B29-F687-4F45-9708-019B960494DF}">
-              <a14:hiddenLine xmlns:a14="http://schemas.microsoft.com/office/drawing/2010/main" w="9525">
-                <a:solidFill>
-                  <a:srgbClr val="000000"/>
-                </a:solidFill>
-                <a:miter lim="800000"/>
-                <a:headEnd/>
-                <a:tailEnd/>
-              </a14:hiddenLine>
-            </a:ext>
-          </a:extLst>
-        </p:spPr>
-      </p:pic>
     </p:spTree>
     <p:extLst>
       <p:ext uri="{BB962C8B-B14F-4D97-AF65-F5344CB8AC3E}">
@@ -2317,60 +2271,6 @@
           </a:p>
         </p:txBody>
       </p:sp>
-      <p:pic>
-        <p:nvPicPr>
-          <p:cNvPr id="5" name="Picture 11"/>
-          <p:cNvPicPr>
-            <a:picLocks noChangeAspect="1"/>
-          </p:cNvPicPr>
-          <p:nvPr userDrawn="1"/>
-        </p:nvPicPr>
-        <p:blipFill>
-          <a:blip r:embed="rId2" cstate="screen">
-            <a:extLst>
-              <a:ext uri="{28A0092B-C50C-407E-A947-70E740481C1C}">
-                <a14:useLocalDpi xmlns:a14="http://schemas.microsoft.com/office/drawing/2010/main"/>
-              </a:ext>
-            </a:extLst>
-          </a:blip>
-          <a:srcRect/>
-          <a:stretch>
-            <a:fillRect/>
-          </a:stretch>
-        </p:blipFill>
-        <p:spPr bwMode="auto">
-          <a:xfrm>
-            <a:off x="11137503" y="123980"/>
-            <a:ext cx="719137" cy="858837"/>
-          </a:xfrm>
-          <a:prstGeom prst="rect">
-            <a:avLst/>
-          </a:prstGeom>
-          <a:noFill/>
-          <a:ln>
-            <a:noFill/>
-          </a:ln>
-          <a:extLst>
-            <a:ext uri="{909E8E84-426E-40DD-AFC4-6F175D3DCCD1}">
-              <a14:hiddenFill xmlns:a14="http://schemas.microsoft.com/office/drawing/2010/main">
-                <a:solidFill>
-                  <a:srgbClr val="FFFFFF"/>
-                </a:solidFill>
-              </a14:hiddenFill>
-            </a:ext>
-            <a:ext uri="{91240B29-F687-4F45-9708-019B960494DF}">
-              <a14:hiddenLine xmlns:a14="http://schemas.microsoft.com/office/drawing/2010/main" w="9525">
-                <a:solidFill>
-                  <a:srgbClr val="000000"/>
-                </a:solidFill>
-                <a:miter lim="800000"/>
-                <a:headEnd/>
-                <a:tailEnd/>
-              </a14:hiddenLine>
-            </a:ext>
-          </a:extLst>
-        </p:spPr>
-      </p:pic>
     </p:spTree>
     <p:extLst>
       <p:ext uri="{BB962C8B-B14F-4D97-AF65-F5344CB8AC3E}">
@@ -2540,60 +2440,6 @@
           </a:p>
         </p:txBody>
       </p:sp>
-      <p:pic>
-        <p:nvPicPr>
-          <p:cNvPr id="5" name="Picture 11"/>
-          <p:cNvPicPr>
-            <a:picLocks noChangeAspect="1"/>
-          </p:cNvPicPr>
-          <p:nvPr userDrawn="1"/>
-        </p:nvPicPr>
-        <p:blipFill>
-          <a:blip r:embed="rId2" cstate="screen">
-            <a:extLst>
-              <a:ext uri="{28A0092B-C50C-407E-A947-70E740481C1C}">
-                <a14:useLocalDpi xmlns:a14="http://schemas.microsoft.com/office/drawing/2010/main"/>
-              </a:ext>
-            </a:extLst>
-          </a:blip>
-          <a:srcRect/>
-          <a:stretch>
-            <a:fillRect/>
-          </a:stretch>
-        </p:blipFill>
-        <p:spPr bwMode="auto">
-          <a:xfrm>
-            <a:off x="11137503" y="123980"/>
-            <a:ext cx="719137" cy="858837"/>
-          </a:xfrm>
-          <a:prstGeom prst="rect">
-            <a:avLst/>
-          </a:prstGeom>
-          <a:noFill/>
-          <a:ln>
-            <a:noFill/>
-          </a:ln>
-          <a:extLst>
-            <a:ext uri="{909E8E84-426E-40DD-AFC4-6F175D3DCCD1}">
-              <a14:hiddenFill xmlns:a14="http://schemas.microsoft.com/office/drawing/2010/main">
-                <a:solidFill>
-                  <a:srgbClr val="FFFFFF"/>
-                </a:solidFill>
-              </a14:hiddenFill>
-            </a:ext>
-            <a:ext uri="{91240B29-F687-4F45-9708-019B960494DF}">
-              <a14:hiddenLine xmlns:a14="http://schemas.microsoft.com/office/drawing/2010/main" w="9525">
-                <a:solidFill>
-                  <a:srgbClr val="000000"/>
-                </a:solidFill>
-                <a:miter lim="800000"/>
-                <a:headEnd/>
-                <a:tailEnd/>
-              </a14:hiddenLine>
-            </a:ext>
-          </a:extLst>
-        </p:spPr>
-      </p:pic>
     </p:spTree>
     <p:extLst>
       <p:ext uri="{BB962C8B-B14F-4D97-AF65-F5344CB8AC3E}">
@@ -2624,60 +2470,6 @@
           <a:chExt cx="0" cy="0"/>
         </a:xfrm>
       </p:grpSpPr>
-      <p:pic>
-        <p:nvPicPr>
-          <p:cNvPr id="2" name="Picture 11"/>
-          <p:cNvPicPr>
-            <a:picLocks noChangeAspect="1"/>
-          </p:cNvPicPr>
-          <p:nvPr userDrawn="1"/>
-        </p:nvPicPr>
-        <p:blipFill>
-          <a:blip r:embed="rId2" cstate="screen">
-            <a:extLst>
-              <a:ext uri="{28A0092B-C50C-407E-A947-70E740481C1C}">
-                <a14:useLocalDpi xmlns:a14="http://schemas.microsoft.com/office/drawing/2010/main"/>
-              </a:ext>
-            </a:extLst>
-          </a:blip>
-          <a:srcRect/>
-          <a:stretch>
-            <a:fillRect/>
-          </a:stretch>
-        </p:blipFill>
-        <p:spPr bwMode="auto">
-          <a:xfrm>
-            <a:off x="11137503" y="123980"/>
-            <a:ext cx="719137" cy="858837"/>
-          </a:xfrm>
-          <a:prstGeom prst="rect">
-            <a:avLst/>
-          </a:prstGeom>
-          <a:noFill/>
-          <a:ln>
-            <a:noFill/>
-          </a:ln>
-          <a:extLst>
-            <a:ext uri="{909E8E84-426E-40DD-AFC4-6F175D3DCCD1}">
-              <a14:hiddenFill xmlns:a14="http://schemas.microsoft.com/office/drawing/2010/main">
-                <a:solidFill>
-                  <a:srgbClr val="FFFFFF"/>
-                </a:solidFill>
-              </a14:hiddenFill>
-            </a:ext>
-            <a:ext uri="{91240B29-F687-4F45-9708-019B960494DF}">
-              <a14:hiddenLine xmlns:a14="http://schemas.microsoft.com/office/drawing/2010/main" w="9525">
-                <a:solidFill>
-                  <a:srgbClr val="000000"/>
-                </a:solidFill>
-                <a:miter lim="800000"/>
-                <a:headEnd/>
-                <a:tailEnd/>
-              </a14:hiddenLine>
-            </a:ext>
-          </a:extLst>
-        </p:spPr>
-      </p:pic>
     </p:spTree>
     <p:extLst>
       <p:ext uri="{BB962C8B-B14F-4D97-AF65-F5344CB8AC3E}">
@@ -3346,109 +3138,6 @@
           </a:p>
         </p:txBody>
       </p:sp>
-      <p:sp>
-        <p:nvSpPr>
-          <p:cNvPr id="4" name="TextBox 3"/>
-          <p:cNvSpPr txBox="1"/>
-          <p:nvPr/>
-        </p:nvSpPr>
-        <p:spPr>
-          <a:xfrm>
-            <a:off x="1414462" y="5514945"/>
-            <a:ext cx="9363075" cy="400110"/>
-          </a:xfrm>
-          <a:prstGeom prst="rect">
-            <a:avLst/>
-          </a:prstGeom>
-          <a:noFill/>
-        </p:spPr>
-        <p:txBody>
-          <a:bodyPr wrap="square" rtlCol="0">
-            <a:spAutoFit/>
-          </a:bodyPr>
-          <a:lstStyle>
-            <a:lvl1pPr>
-              <a:defRPr>
-                <a:latin typeface="+mj-lt"/>
-                <a:ea typeface="+mj-ea"/>
-                <a:cs typeface="+mj-cs"/>
-                <a:sym typeface="Helvetica"/>
-              </a:defRPr>
-            </a:lvl1pPr>
-            <a:lvl2pPr>
-              <a:defRPr>
-                <a:latin typeface="+mj-lt"/>
-                <a:ea typeface="+mj-ea"/>
-                <a:cs typeface="+mj-cs"/>
-                <a:sym typeface="Helvetica"/>
-              </a:defRPr>
-            </a:lvl2pPr>
-            <a:lvl3pPr>
-              <a:defRPr>
-                <a:latin typeface="+mj-lt"/>
-                <a:ea typeface="+mj-ea"/>
-                <a:cs typeface="+mj-cs"/>
-                <a:sym typeface="Helvetica"/>
-              </a:defRPr>
-            </a:lvl3pPr>
-            <a:lvl4pPr>
-              <a:defRPr>
-                <a:latin typeface="+mj-lt"/>
-                <a:ea typeface="+mj-ea"/>
-                <a:cs typeface="+mj-cs"/>
-                <a:sym typeface="Helvetica"/>
-              </a:defRPr>
-            </a:lvl4pPr>
-            <a:lvl5pPr>
-              <a:defRPr>
-                <a:latin typeface="+mj-lt"/>
-                <a:ea typeface="+mj-ea"/>
-                <a:cs typeface="+mj-cs"/>
-                <a:sym typeface="Helvetica"/>
-              </a:defRPr>
-            </a:lvl5pPr>
-            <a:lvl6pPr>
-              <a:defRPr>
-                <a:latin typeface="+mj-lt"/>
-                <a:ea typeface="+mj-ea"/>
-                <a:cs typeface="+mj-cs"/>
-                <a:sym typeface="Helvetica"/>
-              </a:defRPr>
-            </a:lvl6pPr>
-            <a:lvl7pPr>
-              <a:defRPr>
-                <a:latin typeface="+mj-lt"/>
-                <a:ea typeface="+mj-ea"/>
-                <a:cs typeface="+mj-cs"/>
-                <a:sym typeface="Helvetica"/>
-              </a:defRPr>
-            </a:lvl7pPr>
-            <a:lvl8pPr>
-              <a:defRPr>
-                <a:latin typeface="+mj-lt"/>
-                <a:ea typeface="+mj-ea"/>
-                <a:cs typeface="+mj-cs"/>
-                <a:sym typeface="Helvetica"/>
-              </a:defRPr>
-            </a:lvl8pPr>
-            <a:lvl9pPr>
-              <a:defRPr>
-                <a:latin typeface="+mj-lt"/>
-                <a:ea typeface="+mj-ea"/>
-                <a:cs typeface="+mj-cs"/>
-                <a:sym typeface="Helvetica"/>
-              </a:defRPr>
-            </a:lvl9pPr>
-          </a:lstStyle>
-          <a:p>
-            <a:pPr algn="ctr"/>
-            <a:r>
-              <a:rPr lang="en-GB" sz="2000" dirty="0"/>
-              <a:t>Slides, test data and demo macros can be downloaded from http://goo.gl/urxwo9</a:t>
-            </a:r>
-          </a:p>
-        </p:txBody>
-      </p:sp>
     </p:spTree>
     <p:extLst>
       <p:ext uri="{BB962C8B-B14F-4D97-AF65-F5344CB8AC3E}">
@@ -3459,13 +3148,13 @@
   <p:clrMapOvr>
     <a:masterClrMapping/>
   </p:clrMapOvr>
-  <mc:AlternateContent xmlns:mc="http://schemas.openxmlformats.org/markup-compatibility/2006" xmlns:p14="http://schemas.microsoft.com/office/powerpoint/2010/main">
-    <mc:Choice Requires="p14">
+  <mc:AlternateContent xmlns:mc="http://schemas.openxmlformats.org/markup-compatibility/2006">
+    <mc:Choice xmlns:p14="http://schemas.microsoft.com/office/powerpoint/2010/main" Requires="p14">
       <p:transition p14:dur="300">
         <p:fade/>
       </p:transition>
     </mc:Choice>
-    <mc:Fallback xmlns="">
+    <mc:Fallback>
       <p:transition>
         <p:fade/>
       </p:transition>
@@ -3641,13 +3330,13 @@
   <p:clrMapOvr>
     <a:masterClrMapping/>
   </p:clrMapOvr>
-  <mc:AlternateContent xmlns:mc="http://schemas.openxmlformats.org/markup-compatibility/2006" xmlns:p14="http://schemas.microsoft.com/office/powerpoint/2010/main">
-    <mc:Choice Requires="p14">
+  <mc:AlternateContent xmlns:mc="http://schemas.openxmlformats.org/markup-compatibility/2006">
+    <mc:Choice xmlns:p14="http://schemas.microsoft.com/office/powerpoint/2010/main" Requires="p14">
       <p:transition p14:dur="300">
         <p:fade/>
       </p:transition>
     </mc:Choice>
-    <mc:Fallback xmlns="">
+    <mc:Fallback>
       <p:transition>
         <p:fade/>
       </p:transition>
@@ -4116,13 +3805,13 @@
   <p:clrMapOvr>
     <a:masterClrMapping/>
   </p:clrMapOvr>
-  <mc:AlternateContent xmlns:mc="http://schemas.openxmlformats.org/markup-compatibility/2006" xmlns:p14="http://schemas.microsoft.com/office/powerpoint/2010/main">
-    <mc:Choice Requires="p14">
+  <mc:AlternateContent xmlns:mc="http://schemas.openxmlformats.org/markup-compatibility/2006">
+    <mc:Choice xmlns:p14="http://schemas.microsoft.com/office/powerpoint/2010/main" Requires="p14">
       <p:transition p14:dur="300">
         <p:fade/>
       </p:transition>
     </mc:Choice>
-    <mc:Fallback xmlns="">
+    <mc:Fallback>
       <p:transition>
         <p:fade/>
       </p:transition>
@@ -4555,13 +4244,13 @@
   <p:clrMapOvr>
     <a:masterClrMapping/>
   </p:clrMapOvr>
-  <mc:AlternateContent xmlns:mc="http://schemas.openxmlformats.org/markup-compatibility/2006" xmlns:p14="http://schemas.microsoft.com/office/powerpoint/2010/main">
-    <mc:Choice Requires="p14">
+  <mc:AlternateContent xmlns:mc="http://schemas.openxmlformats.org/markup-compatibility/2006">
+    <mc:Choice xmlns:p14="http://schemas.microsoft.com/office/powerpoint/2010/main" Requires="p14">
       <p:transition p14:dur="300">
         <p:fade/>
       </p:transition>
     </mc:Choice>
-    <mc:Fallback xmlns="">
+    <mc:Fallback>
       <p:transition>
         <p:fade/>
       </p:transition>
@@ -5009,13 +4698,13 @@
   <p:clrMapOvr>
     <a:masterClrMapping/>
   </p:clrMapOvr>
-  <mc:AlternateContent xmlns:mc="http://schemas.openxmlformats.org/markup-compatibility/2006" xmlns:p14="http://schemas.microsoft.com/office/powerpoint/2010/main">
-    <mc:Choice Requires="p14">
+  <mc:AlternateContent xmlns:mc="http://schemas.openxmlformats.org/markup-compatibility/2006">
+    <mc:Choice xmlns:p14="http://schemas.microsoft.com/office/powerpoint/2010/main" Requires="p14">
       <p:transition p14:dur="300">
         <p:fade/>
       </p:transition>
     </mc:Choice>
-    <mc:Fallback xmlns="">
+    <mc:Fallback>
       <p:transition>
         <p:fade/>
       </p:transition>
@@ -5783,13 +5472,13 @@
   <p:clrMapOvr>
     <a:masterClrMapping/>
   </p:clrMapOvr>
-  <mc:AlternateContent xmlns:mc="http://schemas.openxmlformats.org/markup-compatibility/2006" xmlns:p14="http://schemas.microsoft.com/office/powerpoint/2010/main">
-    <mc:Choice Requires="p14">
+  <mc:AlternateContent xmlns:mc="http://schemas.openxmlformats.org/markup-compatibility/2006">
+    <mc:Choice xmlns:p14="http://schemas.microsoft.com/office/powerpoint/2010/main" Requires="p14">
       <p:transition p14:dur="300">
         <p:fade/>
       </p:transition>
     </mc:Choice>
-    <mc:Fallback xmlns="">
+    <mc:Fallback>
       <p:transition>
         <p:fade/>
       </p:transition>
@@ -6933,13 +6622,13 @@
   <p:clrMapOvr>
     <a:masterClrMapping/>
   </p:clrMapOvr>
-  <mc:AlternateContent xmlns:mc="http://schemas.openxmlformats.org/markup-compatibility/2006" xmlns:p14="http://schemas.microsoft.com/office/powerpoint/2010/main">
-    <mc:Choice Requires="p14">
+  <mc:AlternateContent xmlns:mc="http://schemas.openxmlformats.org/markup-compatibility/2006">
+    <mc:Choice xmlns:p14="http://schemas.microsoft.com/office/powerpoint/2010/main" Requires="p14">
       <p:transition p14:dur="300">
         <p:fade/>
       </p:transition>
     </mc:Choice>
-    <mc:Fallback xmlns="">
+    <mc:Fallback>
       <p:transition>
         <p:fade/>
       </p:transition>
@@ -7526,13 +7215,13 @@
   <p:clrMapOvr>
     <a:masterClrMapping/>
   </p:clrMapOvr>
-  <mc:AlternateContent xmlns:mc="http://schemas.openxmlformats.org/markup-compatibility/2006" xmlns:p14="http://schemas.microsoft.com/office/powerpoint/2010/main">
-    <mc:Choice Requires="p14">
+  <mc:AlternateContent xmlns:mc="http://schemas.openxmlformats.org/markup-compatibility/2006">
+    <mc:Choice xmlns:p14="http://schemas.microsoft.com/office/powerpoint/2010/main" Requires="p14">
       <p:transition p14:dur="300">
         <p:fade/>
       </p:transition>
     </mc:Choice>
-    <mc:Fallback xmlns="">
+    <mc:Fallback>
       <p:transition>
         <p:fade/>
       </p:transition>
@@ -7716,13 +7405,13 @@
   <p:clrMapOvr>
     <a:masterClrMapping/>
   </p:clrMapOvr>
-  <mc:AlternateContent xmlns:mc="http://schemas.openxmlformats.org/markup-compatibility/2006" xmlns:p14="http://schemas.microsoft.com/office/powerpoint/2010/main">
-    <mc:Choice Requires="p14">
+  <mc:AlternateContent xmlns:mc="http://schemas.openxmlformats.org/markup-compatibility/2006">
+    <mc:Choice xmlns:p14="http://schemas.microsoft.com/office/powerpoint/2010/main" Requires="p14">
       <p:transition p14:dur="300">
         <p:fade/>
       </p:transition>
     </mc:Choice>
-    <mc:Fallback xmlns="">
+    <mc:Fallback>
       <p:transition>
         <p:fade/>
       </p:transition>
@@ -8149,13 +7838,13 @@
   <p:clrMapOvr>
     <a:masterClrMapping/>
   </p:clrMapOvr>
-  <mc:AlternateContent xmlns:mc="http://schemas.openxmlformats.org/markup-compatibility/2006" xmlns:p14="http://schemas.microsoft.com/office/powerpoint/2010/main">
-    <mc:Choice Requires="p14">
+  <mc:AlternateContent xmlns:mc="http://schemas.openxmlformats.org/markup-compatibility/2006">
+    <mc:Choice xmlns:p14="http://schemas.microsoft.com/office/powerpoint/2010/main" Requires="p14">
       <p:transition p14:dur="300">
         <p:fade/>
       </p:transition>
     </mc:Choice>
-    <mc:Fallback xmlns="">
+    <mc:Fallback>
       <p:transition>
         <p:fade/>
       </p:transition>
@@ -8350,13 +8039,13 @@
   <p:clrMapOvr>
     <a:masterClrMapping/>
   </p:clrMapOvr>
-  <mc:AlternateContent xmlns:mc="http://schemas.openxmlformats.org/markup-compatibility/2006" xmlns:p14="http://schemas.microsoft.com/office/powerpoint/2010/main">
-    <mc:Choice Requires="p14">
+  <mc:AlternateContent xmlns:mc="http://schemas.openxmlformats.org/markup-compatibility/2006">
+    <mc:Choice xmlns:p14="http://schemas.microsoft.com/office/powerpoint/2010/main" Requires="p14">
       <p:transition p14:dur="300">
         <p:fade/>
       </p:transition>
     </mc:Choice>
-    <mc:Fallback xmlns="">
+    <mc:Fallback>
       <p:transition>
         <p:fade/>
       </p:transition>
@@ -8451,15 +8140,9 @@
             </a:r>
           </a:p>
           <a:p>
-            <a:endParaRPr lang="en-US" sz="1600" dirty="0"/>
-          </a:p>
-          <a:p>
-            <a:r>
-              <a:rPr lang="en-US" sz="2800" dirty="0"/>
-              <a:t>Short break</a:t>
-            </a:r>
-          </a:p>
-          <a:p>
+            <a:pPr marL="0" indent="0">
+              <a:buNone/>
+            </a:pPr>
             <a:endParaRPr lang="en-US" sz="1600" dirty="0"/>
           </a:p>
           <a:p>
@@ -8478,9 +8161,25 @@
           <a:p>
             <a:pPr lvl="1"/>
             <a:r>
+              <a:rPr lang="en-US" dirty="0"/>
+              <a:t>Using the macro recorder</a:t>
+            </a:r>
+            <a:endParaRPr lang="en-US" sz="2400" dirty="0"/>
+          </a:p>
+          <a:p>
+            <a:pPr lvl="1"/>
+            <a:r>
               <a:rPr lang="en-US" sz="2400" dirty="0"/>
               <a:t>Displaying user interface elements (options boxes)</a:t>
             </a:r>
+          </a:p>
+          <a:p>
+            <a:pPr lvl="1"/>
+            <a:r>
+              <a:rPr lang="en-US" dirty="0"/>
+              <a:t>Creating a macro to perform analysis of detected objects</a:t>
+            </a:r>
+            <a:endParaRPr lang="en-US" sz="2400" dirty="0"/>
           </a:p>
           <a:p>
             <a:pPr lvl="1"/>
@@ -8554,13 +8253,13 @@
   <p:clrMapOvr>
     <a:masterClrMapping/>
   </p:clrMapOvr>
-  <mc:AlternateContent xmlns:mc="http://schemas.openxmlformats.org/markup-compatibility/2006" xmlns:p14="http://schemas.microsoft.com/office/powerpoint/2010/main">
-    <mc:Choice Requires="p14">
+  <mc:AlternateContent xmlns:mc="http://schemas.openxmlformats.org/markup-compatibility/2006">
+    <mc:Choice xmlns:p14="http://schemas.microsoft.com/office/powerpoint/2010/main" Requires="p14">
       <p:transition p14:dur="300">
         <p:fade/>
       </p:transition>
     </mc:Choice>
-    <mc:Fallback xmlns="">
+    <mc:Fallback>
       <p:transition>
         <p:fade/>
       </p:transition>
@@ -8729,13 +8428,13 @@
   <p:clrMapOvr>
     <a:masterClrMapping/>
   </p:clrMapOvr>
-  <mc:AlternateContent xmlns:mc="http://schemas.openxmlformats.org/markup-compatibility/2006" xmlns:p14="http://schemas.microsoft.com/office/powerpoint/2010/main">
-    <mc:Choice Requires="p14">
+  <mc:AlternateContent xmlns:mc="http://schemas.openxmlformats.org/markup-compatibility/2006">
+    <mc:Choice xmlns:p14="http://schemas.microsoft.com/office/powerpoint/2010/main" Requires="p14">
       <p:transition p14:dur="300">
         <p:fade/>
       </p:transition>
     </mc:Choice>
-    <mc:Fallback xmlns="">
+    <mc:Fallback>
       <p:transition>
         <p:fade/>
       </p:transition>
@@ -8826,7 +8525,7 @@
             <a:pPr lvl="1"/>
             <a:r>
               <a:rPr lang="en-GB" dirty="0"/>
-              <a:t>Can return single values (e.g. strings, numbers or arrays</a:t>
+              <a:t>Can return single values (e.g. strings, numbers or arrays)</a:t>
             </a:r>
           </a:p>
           <a:p>
@@ -9106,6 +8805,18 @@
   <p:clrMapOvr>
     <a:masterClrMapping/>
   </p:clrMapOvr>
+  <mc:AlternateContent xmlns:mc="http://schemas.openxmlformats.org/markup-compatibility/2006">
+    <mc:Choice xmlns:p14="http://schemas.microsoft.com/office/powerpoint/2010/main" Requires="p14">
+      <p:transition p14:dur="300">
+        <p:fade/>
+      </p:transition>
+    </mc:Choice>
+    <mc:Fallback>
+      <p:transition>
+        <p:fade/>
+      </p:transition>
+    </mc:Fallback>
+  </mc:AlternateContent>
   <p:timing>
     <p:tnLst>
       <p:par>
@@ -10109,6 +9820,18 @@
   <p:clrMapOvr>
     <a:masterClrMapping/>
   </p:clrMapOvr>
+  <mc:AlternateContent xmlns:mc="http://schemas.openxmlformats.org/markup-compatibility/2006">
+    <mc:Choice xmlns:p14="http://schemas.microsoft.com/office/powerpoint/2010/main" Requires="p14">
+      <p:transition p14:dur="300">
+        <p:fade/>
+      </p:transition>
+    </mc:Choice>
+    <mc:Fallback>
+      <p:transition>
+        <p:fade/>
+      </p:transition>
+    </mc:Fallback>
+  </mc:AlternateContent>
   <p:timing>
     <p:tnLst>
       <p:par>
@@ -10962,13 +10685,13 @@
   <p:clrMapOvr>
     <a:masterClrMapping/>
   </p:clrMapOvr>
-  <mc:AlternateContent xmlns:mc="http://schemas.openxmlformats.org/markup-compatibility/2006" xmlns:p14="http://schemas.microsoft.com/office/powerpoint/2010/main">
-    <mc:Choice Requires="p14">
+  <mc:AlternateContent xmlns:mc="http://schemas.openxmlformats.org/markup-compatibility/2006">
+    <mc:Choice xmlns:p14="http://schemas.microsoft.com/office/powerpoint/2010/main" Requires="p14">
       <p:transition p14:dur="300">
         <p:fade/>
       </p:transition>
     </mc:Choice>
-    <mc:Fallback xmlns="">
+    <mc:Fallback>
       <p:transition>
         <p:fade/>
       </p:transition>
@@ -11837,13 +11560,13 @@
   <p:clrMapOvr>
     <a:masterClrMapping/>
   </p:clrMapOvr>
-  <mc:AlternateContent xmlns:mc="http://schemas.openxmlformats.org/markup-compatibility/2006" xmlns:p14="http://schemas.microsoft.com/office/powerpoint/2010/main">
-    <mc:Choice Requires="p14">
+  <mc:AlternateContent xmlns:mc="http://schemas.openxmlformats.org/markup-compatibility/2006">
+    <mc:Choice xmlns:p14="http://schemas.microsoft.com/office/powerpoint/2010/main" Requires="p14">
       <p:transition p14:dur="300">
         <p:fade/>
       </p:transition>
     </mc:Choice>
-    <mc:Fallback xmlns="">
+    <mc:Fallback>
       <p:transition>
         <p:fade/>
       </p:transition>
@@ -12672,13 +12395,13 @@
   <p:clrMapOvr>
     <a:masterClrMapping/>
   </p:clrMapOvr>
-  <mc:AlternateContent xmlns:mc="http://schemas.openxmlformats.org/markup-compatibility/2006" xmlns:p14="http://schemas.microsoft.com/office/powerpoint/2010/main">
-    <mc:Choice Requires="p14">
+  <mc:AlternateContent xmlns:mc="http://schemas.openxmlformats.org/markup-compatibility/2006">
+    <mc:Choice xmlns:p14="http://schemas.microsoft.com/office/powerpoint/2010/main" Requires="p14">
       <p:transition p14:dur="300">
         <p:fade/>
       </p:transition>
     </mc:Choice>
-    <mc:Fallback xmlns="">
+    <mc:Fallback>
       <p:transition>
         <p:fade/>
       </p:transition>
@@ -13323,13 +13046,13 @@
   <p:clrMapOvr>
     <a:masterClrMapping/>
   </p:clrMapOvr>
-  <mc:AlternateContent xmlns:mc="http://schemas.openxmlformats.org/markup-compatibility/2006" xmlns:p14="http://schemas.microsoft.com/office/powerpoint/2010/main">
-    <mc:Choice Requires="p14">
+  <mc:AlternateContent xmlns:mc="http://schemas.openxmlformats.org/markup-compatibility/2006">
+    <mc:Choice xmlns:p14="http://schemas.microsoft.com/office/powerpoint/2010/main" Requires="p14">
       <p:transition p14:dur="300">
         <p:fade/>
       </p:transition>
     </mc:Choice>
-    <mc:Fallback xmlns="">
+    <mc:Fallback>
       <p:transition>
         <p:fade/>
       </p:transition>
@@ -13523,13 +13246,13 @@
   <p:clrMapOvr>
     <a:masterClrMapping/>
   </p:clrMapOvr>
-  <mc:AlternateContent xmlns:mc="http://schemas.openxmlformats.org/markup-compatibility/2006" xmlns:p14="http://schemas.microsoft.com/office/powerpoint/2010/main">
-    <mc:Choice Requires="p14">
+  <mc:AlternateContent xmlns:mc="http://schemas.openxmlformats.org/markup-compatibility/2006">
+    <mc:Choice xmlns:p14="http://schemas.microsoft.com/office/powerpoint/2010/main" Requires="p14">
       <p:transition p14:dur="300">
         <p:fade/>
       </p:transition>
     </mc:Choice>
-    <mc:Fallback xmlns="">
+    <mc:Fallback>
       <p:transition>
         <p:fade/>
       </p:transition>
@@ -14016,13 +13739,13 @@
   <p:clrMapOvr>
     <a:masterClrMapping/>
   </p:clrMapOvr>
-  <mc:AlternateContent xmlns:mc="http://schemas.openxmlformats.org/markup-compatibility/2006" xmlns:p14="http://schemas.microsoft.com/office/powerpoint/2010/main">
-    <mc:Choice Requires="p14">
+  <mc:AlternateContent xmlns:mc="http://schemas.openxmlformats.org/markup-compatibility/2006">
+    <mc:Choice xmlns:p14="http://schemas.microsoft.com/office/powerpoint/2010/main" Requires="p14">
       <p:transition p14:dur="300">
         <p:fade/>
       </p:transition>
     </mc:Choice>
-    <mc:Fallback xmlns="">
+    <mc:Fallback>
       <p:transition>
         <p:fade/>
       </p:transition>
@@ -14507,13 +14230,13 @@
   <p:clrMapOvr>
     <a:masterClrMapping/>
   </p:clrMapOvr>
-  <mc:AlternateContent xmlns:mc="http://schemas.openxmlformats.org/markup-compatibility/2006" xmlns:p14="http://schemas.microsoft.com/office/powerpoint/2010/main">
-    <mc:Choice Requires="p14">
+  <mc:AlternateContent xmlns:mc="http://schemas.openxmlformats.org/markup-compatibility/2006">
+    <mc:Choice xmlns:p14="http://schemas.microsoft.com/office/powerpoint/2010/main" Requires="p14">
       <p:transition p14:dur="300">
         <p:fade/>
       </p:transition>
     </mc:Choice>
-    <mc:Fallback xmlns="">
+    <mc:Fallback>
       <p:transition>
         <p:fade/>
       </p:transition>
@@ -15334,13 +15057,13 @@
   <p:clrMapOvr>
     <a:masterClrMapping/>
   </p:clrMapOvr>
-  <mc:AlternateContent xmlns:mc="http://schemas.openxmlformats.org/markup-compatibility/2006" xmlns:p14="http://schemas.microsoft.com/office/powerpoint/2010/main">
-    <mc:Choice Requires="p14">
+  <mc:AlternateContent xmlns:mc="http://schemas.openxmlformats.org/markup-compatibility/2006">
+    <mc:Choice xmlns:p14="http://schemas.microsoft.com/office/powerpoint/2010/main" Requires="p14">
       <p:transition p14:dur="300">
         <p:fade/>
       </p:transition>
     </mc:Choice>
-    <mc:Fallback xmlns="">
+    <mc:Fallback>
       <p:transition>
         <p:fade/>
       </p:transition>
@@ -17000,6 +16723,18 @@
   <p:clrMapOvr>
     <a:masterClrMapping/>
   </p:clrMapOvr>
+  <mc:AlternateContent xmlns:mc="http://schemas.openxmlformats.org/markup-compatibility/2006">
+    <mc:Choice xmlns:p14="http://schemas.microsoft.com/office/powerpoint/2010/main" Requires="p14">
+      <p:transition p14:dur="300">
+        <p:fade/>
+      </p:transition>
+    </mc:Choice>
+    <mc:Fallback>
+      <p:transition>
+        <p:fade/>
+      </p:transition>
+    </mc:Fallback>
+  </mc:AlternateContent>
 </p:sld>
 </file>
 
@@ -21909,6 +21644,18 @@
   <p:clrMapOvr>
     <a:masterClrMapping/>
   </p:clrMapOvr>
+  <mc:AlternateContent xmlns:mc="http://schemas.openxmlformats.org/markup-compatibility/2006">
+    <mc:Choice xmlns:p14="http://schemas.microsoft.com/office/powerpoint/2010/main" Requires="p14">
+      <p:transition p14:dur="300">
+        <p:fade/>
+      </p:transition>
+    </mc:Choice>
+    <mc:Fallback>
+      <p:transition>
+        <p:fade/>
+      </p:transition>
+    </mc:Fallback>
+  </mc:AlternateContent>
   <p:timing>
     <p:tnLst>
       <p:par>
@@ -26563,6 +26310,18 @@
   <p:clrMapOvr>
     <a:masterClrMapping/>
   </p:clrMapOvr>
+  <mc:AlternateContent xmlns:mc="http://schemas.openxmlformats.org/markup-compatibility/2006">
+    <mc:Choice xmlns:p14="http://schemas.microsoft.com/office/powerpoint/2010/main" Requires="p14">
+      <p:transition p14:dur="300">
+        <p:fade/>
+      </p:transition>
+    </mc:Choice>
+    <mc:Fallback>
+      <p:transition>
+        <p:fade/>
+      </p:transition>
+    </mc:Fallback>
+  </mc:AlternateContent>
 </p:sld>
 </file>
 
@@ -26642,6 +26401,18 @@
   <p:clrMapOvr>
     <a:masterClrMapping/>
   </p:clrMapOvr>
+  <mc:AlternateContent xmlns:mc="http://schemas.openxmlformats.org/markup-compatibility/2006">
+    <mc:Choice xmlns:p14="http://schemas.microsoft.com/office/powerpoint/2010/main" Requires="p14">
+      <p:transition p14:dur="300">
+        <p:fade/>
+      </p:transition>
+    </mc:Choice>
+    <mc:Fallback>
+      <p:transition>
+        <p:fade/>
+      </p:transition>
+    </mc:Fallback>
+  </mc:AlternateContent>
 </p:sld>
 </file>
 
@@ -26737,13 +26508,13 @@
   <p:clrMapOvr>
     <a:masterClrMapping/>
   </p:clrMapOvr>
-  <mc:AlternateContent xmlns:mc="http://schemas.openxmlformats.org/markup-compatibility/2006" xmlns:p14="http://schemas.microsoft.com/office/powerpoint/2010/main">
-    <mc:Choice Requires="p14">
+  <mc:AlternateContent xmlns:mc="http://schemas.openxmlformats.org/markup-compatibility/2006">
+    <mc:Choice xmlns:p14="http://schemas.microsoft.com/office/powerpoint/2010/main" Requires="p14">
       <p:transition p14:dur="300">
         <p:fade/>
       </p:transition>
     </mc:Choice>
-    <mc:Fallback xmlns="">
+    <mc:Fallback>
       <p:transition>
         <p:fade/>
       </p:transition>
@@ -26915,13 +26686,13 @@
   <p:clrMapOvr>
     <a:masterClrMapping/>
   </p:clrMapOvr>
-  <mc:AlternateContent xmlns:mc="http://schemas.openxmlformats.org/markup-compatibility/2006" xmlns:p14="http://schemas.microsoft.com/office/powerpoint/2010/main">
-    <mc:Choice Requires="p14">
+  <mc:AlternateContent xmlns:mc="http://schemas.openxmlformats.org/markup-compatibility/2006">
+    <mc:Choice xmlns:p14="http://schemas.microsoft.com/office/powerpoint/2010/main" Requires="p14">
       <p:transition p14:dur="300">
         <p:fade/>
       </p:transition>
     </mc:Choice>
-    <mc:Fallback xmlns="">
+    <mc:Fallback>
       <p:transition>
         <p:fade/>
       </p:transition>
@@ -27066,13 +26837,13 @@
   <p:clrMapOvr>
     <a:masterClrMapping/>
   </p:clrMapOvr>
-  <mc:AlternateContent xmlns:mc="http://schemas.openxmlformats.org/markup-compatibility/2006" xmlns:p14="http://schemas.microsoft.com/office/powerpoint/2010/main">
-    <mc:Choice Requires="p14">
+  <mc:AlternateContent xmlns:mc="http://schemas.openxmlformats.org/markup-compatibility/2006">
+    <mc:Choice xmlns:p14="http://schemas.microsoft.com/office/powerpoint/2010/main" Requires="p14">
       <p:transition p14:dur="300">
         <p:fade/>
       </p:transition>
     </mc:Choice>
-    <mc:Fallback xmlns="">
+    <mc:Fallback>
       <p:transition>
         <p:fade/>
       </p:transition>
@@ -27214,13 +26985,13 @@
   <p:clrMapOvr>
     <a:masterClrMapping/>
   </p:clrMapOvr>
-  <mc:AlternateContent xmlns:mc="http://schemas.openxmlformats.org/markup-compatibility/2006" xmlns:p14="http://schemas.microsoft.com/office/powerpoint/2010/main">
-    <mc:Choice Requires="p14">
+  <mc:AlternateContent xmlns:mc="http://schemas.openxmlformats.org/markup-compatibility/2006">
+    <mc:Choice xmlns:p14="http://schemas.microsoft.com/office/powerpoint/2010/main" Requires="p14">
       <p:transition p14:dur="300">
         <p:fade/>
       </p:transition>
     </mc:Choice>
-    <mc:Fallback xmlns="">
+    <mc:Fallback>
       <p:transition>
         <p:fade/>
       </p:transition>
@@ -27352,13 +27123,13 @@
   <p:clrMapOvr>
     <a:masterClrMapping/>
   </p:clrMapOvr>
-  <mc:AlternateContent xmlns:mc="http://schemas.openxmlformats.org/markup-compatibility/2006" xmlns:p14="http://schemas.microsoft.com/office/powerpoint/2010/main">
-    <mc:Choice Requires="p14">
+  <mc:AlternateContent xmlns:mc="http://schemas.openxmlformats.org/markup-compatibility/2006">
+    <mc:Choice xmlns:p14="http://schemas.microsoft.com/office/powerpoint/2010/main" Requires="p14">
       <p:transition p14:dur="300">
         <p:fade/>
       </p:transition>
     </mc:Choice>
-    <mc:Fallback xmlns="">
+    <mc:Fallback>
       <p:transition>
         <p:fade/>
       </p:transition>
@@ -27465,13 +27236,13 @@
   <p:clrMapOvr>
     <a:masterClrMapping/>
   </p:clrMapOvr>
-  <mc:AlternateContent xmlns:mc="http://schemas.openxmlformats.org/markup-compatibility/2006" xmlns:p14="http://schemas.microsoft.com/office/powerpoint/2010/main">
-    <mc:Choice Requires="p14">
+  <mc:AlternateContent xmlns:mc="http://schemas.openxmlformats.org/markup-compatibility/2006">
+    <mc:Choice xmlns:p14="http://schemas.microsoft.com/office/powerpoint/2010/main" Requires="p14">
       <p:transition p14:dur="300">
         <p:fade/>
       </p:transition>
     </mc:Choice>
-    <mc:Fallback xmlns="">
+    <mc:Fallback>
       <p:transition>
         <p:fade/>
       </p:transition>
@@ -27608,13 +27379,13 @@
   <p:clrMapOvr>
     <a:masterClrMapping/>
   </p:clrMapOvr>
-  <mc:AlternateContent xmlns:mc="http://schemas.openxmlformats.org/markup-compatibility/2006" xmlns:p14="http://schemas.microsoft.com/office/powerpoint/2010/main">
-    <mc:Choice Requires="p14">
+  <mc:AlternateContent xmlns:mc="http://schemas.openxmlformats.org/markup-compatibility/2006">
+    <mc:Choice xmlns:p14="http://schemas.microsoft.com/office/powerpoint/2010/main" Requires="p14">
       <p:transition p14:dur="300">
         <p:fade/>
       </p:transition>
     </mc:Choice>
-    <mc:Fallback xmlns="">
+    <mc:Fallback>
       <p:transition>
         <p:fade/>
       </p:transition>
@@ -27717,13 +27488,13 @@
   <p:clrMapOvr>
     <a:masterClrMapping/>
   </p:clrMapOvr>
-  <mc:AlternateContent xmlns:mc="http://schemas.openxmlformats.org/markup-compatibility/2006" xmlns:p14="http://schemas.microsoft.com/office/powerpoint/2010/main">
-    <mc:Choice Requires="p14">
+  <mc:AlternateContent xmlns:mc="http://schemas.openxmlformats.org/markup-compatibility/2006">
+    <mc:Choice xmlns:p14="http://schemas.microsoft.com/office/powerpoint/2010/main" Requires="p14">
       <p:transition p14:dur="300">
         <p:fade/>
       </p:transition>
     </mc:Choice>
-    <mc:Fallback xmlns="">
+    <mc:Fallback>
       <p:transition>
         <p:fade/>
       </p:transition>
@@ -27851,13 +27622,13 @@
   <p:clrMapOvr>
     <a:masterClrMapping/>
   </p:clrMapOvr>
-  <mc:AlternateContent xmlns:mc="http://schemas.openxmlformats.org/markup-compatibility/2006" xmlns:p14="http://schemas.microsoft.com/office/powerpoint/2010/main">
-    <mc:Choice Requires="p14">
+  <mc:AlternateContent xmlns:mc="http://schemas.openxmlformats.org/markup-compatibility/2006">
+    <mc:Choice xmlns:p14="http://schemas.microsoft.com/office/powerpoint/2010/main" Requires="p14">
       <p:transition p14:dur="300">
         <p:fade/>
       </p:transition>
     </mc:Choice>
-    <mc:Fallback xmlns="">
+    <mc:Fallback>
       <p:transition>
         <p:fade/>
       </p:transition>
@@ -27977,13 +27748,371 @@
   <p:clrMapOvr>
     <a:masterClrMapping/>
   </p:clrMapOvr>
-  <mc:AlternateContent xmlns:mc="http://schemas.openxmlformats.org/markup-compatibility/2006" xmlns:p14="http://schemas.microsoft.com/office/powerpoint/2010/main">
-    <mc:Choice Requires="p14">
+  <mc:AlternateContent xmlns:mc="http://schemas.openxmlformats.org/markup-compatibility/2006">
+    <mc:Choice xmlns:p14="http://schemas.microsoft.com/office/powerpoint/2010/main" Requires="p14">
       <p:transition p14:dur="300">
         <p:fade/>
       </p:transition>
     </mc:Choice>
-    <mc:Fallback xmlns="">
+    <mc:Fallback>
+      <p:transition>
+        <p:fade/>
+      </p:transition>
+    </mc:Fallback>
+  </mc:AlternateContent>
+</p:sld>
+</file>
+
+<file path=ppt/slides/slide43.xml><?xml version="1.0" encoding="utf-8"?>
+<p:sld xmlns:a="http://schemas.openxmlformats.org/drawingml/2006/main" xmlns:r="http://schemas.openxmlformats.org/officeDocument/2006/relationships" xmlns:p="http://schemas.openxmlformats.org/presentationml/2006/main">
+  <p:cSld>
+    <p:spTree>
+      <p:nvGrpSpPr>
+        <p:cNvPr id="1" name=""/>
+        <p:cNvGrpSpPr/>
+        <p:nvPr/>
+      </p:nvGrpSpPr>
+      <p:grpSpPr>
+        <a:xfrm>
+          <a:off x="0" y="0"/>
+          <a:ext cx="0" cy="0"/>
+          <a:chOff x="0" y="0"/>
+          <a:chExt cx="0" cy="0"/>
+        </a:xfrm>
+      </p:grpSpPr>
+      <p:sp>
+        <p:nvSpPr>
+          <p:cNvPr id="2" name="Title 1">
+            <a:extLst>
+              <a:ext uri="{FF2B5EF4-FFF2-40B4-BE49-F238E27FC236}">
+                <a16:creationId xmlns:a16="http://schemas.microsoft.com/office/drawing/2014/main" id="{17EED7FA-B7AE-4B54-B518-8F4376A3F4F8}"/>
+              </a:ext>
+            </a:extLst>
+          </p:cNvPr>
+          <p:cNvSpPr>
+            <a:spLocks noGrp="1"/>
+          </p:cNvSpPr>
+          <p:nvPr>
+            <p:ph type="title"/>
+          </p:nvPr>
+        </p:nvSpPr>
+        <p:spPr/>
+        <p:txBody>
+          <a:bodyPr/>
+          <a:lstStyle/>
+          <a:p>
+            <a:endParaRPr lang="en-GB" dirty="0"/>
+          </a:p>
+        </p:txBody>
+      </p:sp>
+      <p:sp>
+        <p:nvSpPr>
+          <p:cNvPr id="5" name="TextBox 4">
+            <a:extLst>
+              <a:ext uri="{FF2B5EF4-FFF2-40B4-BE49-F238E27FC236}">
+                <a16:creationId xmlns:a16="http://schemas.microsoft.com/office/drawing/2014/main" id="{CC6275CB-57F2-42E7-AF63-44654C9FB864}"/>
+              </a:ext>
+            </a:extLst>
+          </p:cNvPr>
+          <p:cNvSpPr txBox="1"/>
+          <p:nvPr/>
+        </p:nvSpPr>
+        <p:spPr>
+          <a:xfrm>
+            <a:off x="4733627" y="4535507"/>
+            <a:ext cx="2914650" cy="461665"/>
+          </a:xfrm>
+          <a:prstGeom prst="rect">
+            <a:avLst/>
+          </a:prstGeom>
+          <a:noFill/>
+        </p:spPr>
+        <p:txBody>
+          <a:bodyPr wrap="square">
+            <a:spAutoFit/>
+          </a:bodyPr>
+          <a:lstStyle/>
+          <a:p>
+            <a:pPr algn="ctr"/>
+            <a:r>
+              <a:rPr lang="en-GB" sz="2400" dirty="0">
+                <a:solidFill>
+                  <a:srgbClr val="C00000"/>
+                </a:solidFill>
+              </a:rPr>
+              <a:t>@wbif-bristol</a:t>
+            </a:r>
+          </a:p>
+        </p:txBody>
+      </p:sp>
+      <p:sp>
+        <p:nvSpPr>
+          <p:cNvPr id="9" name="TextBox 8">
+            <a:extLst>
+              <a:ext uri="{FF2B5EF4-FFF2-40B4-BE49-F238E27FC236}">
+                <a16:creationId xmlns:a16="http://schemas.microsoft.com/office/drawing/2014/main" id="{37ECEB8B-D83C-414D-8EA5-47FD79C634AD}"/>
+              </a:ext>
+            </a:extLst>
+          </p:cNvPr>
+          <p:cNvSpPr txBox="1"/>
+          <p:nvPr/>
+        </p:nvSpPr>
+        <p:spPr>
+          <a:xfrm>
+            <a:off x="6762452" y="4350841"/>
+            <a:ext cx="6096000" cy="830997"/>
+          </a:xfrm>
+          <a:prstGeom prst="rect">
+            <a:avLst/>
+          </a:prstGeom>
+          <a:noFill/>
+        </p:spPr>
+        <p:txBody>
+          <a:bodyPr wrap="square">
+            <a:spAutoFit/>
+          </a:bodyPr>
+          <a:lstStyle/>
+          <a:p>
+            <a:pPr algn="ctr"/>
+            <a:r>
+              <a:rPr lang="en-GB" sz="2400" dirty="0">
+                <a:solidFill>
+                  <a:srgbClr val="C00000"/>
+                </a:solidFill>
+              </a:rPr>
+              <a:t>bristol.ac.uk/</a:t>
+            </a:r>
+          </a:p>
+          <a:p>
+            <a:pPr algn="ctr"/>
+            <a:r>
+              <a:rPr lang="en-GB" sz="2400" dirty="0" err="1">
+                <a:solidFill>
+                  <a:srgbClr val="C00000"/>
+                </a:solidFill>
+              </a:rPr>
+              <a:t>wolfson</a:t>
+            </a:r>
+            <a:r>
+              <a:rPr lang="en-GB" sz="2400" dirty="0">
+                <a:solidFill>
+                  <a:srgbClr val="C00000"/>
+                </a:solidFill>
+              </a:rPr>
+              <a:t>-bioimaging</a:t>
+            </a:r>
+          </a:p>
+        </p:txBody>
+      </p:sp>
+      <p:sp>
+        <p:nvSpPr>
+          <p:cNvPr id="11" name="TextBox 10">
+            <a:extLst>
+              <a:ext uri="{FF2B5EF4-FFF2-40B4-BE49-F238E27FC236}">
+                <a16:creationId xmlns:a16="http://schemas.microsoft.com/office/drawing/2014/main" id="{277E6EFD-541C-461A-9975-C5B2A83969FB}"/>
+              </a:ext>
+            </a:extLst>
+          </p:cNvPr>
+          <p:cNvSpPr txBox="1"/>
+          <p:nvPr/>
+        </p:nvSpPr>
+        <p:spPr>
+          <a:xfrm>
+            <a:off x="-595015" y="4535507"/>
+            <a:ext cx="6096000" cy="461665"/>
+          </a:xfrm>
+          <a:prstGeom prst="rect">
+            <a:avLst/>
+          </a:prstGeom>
+          <a:noFill/>
+        </p:spPr>
+        <p:txBody>
+          <a:bodyPr wrap="square">
+            <a:spAutoFit/>
+          </a:bodyPr>
+          <a:lstStyle/>
+          <a:p>
+            <a:pPr algn="ctr"/>
+            <a:r>
+              <a:rPr lang="en-GB" sz="2400" dirty="0">
+                <a:solidFill>
+                  <a:srgbClr val="C00000"/>
+                </a:solidFill>
+              </a:rPr>
+              <a:t>github.com/</a:t>
+            </a:r>
+            <a:r>
+              <a:rPr lang="en-GB" sz="2400" dirty="0" err="1">
+                <a:solidFill>
+                  <a:srgbClr val="C00000"/>
+                </a:solidFill>
+              </a:rPr>
+              <a:t>wbif-bristol</a:t>
+            </a:r>
+            <a:endParaRPr lang="en-GB" sz="2400" dirty="0">
+              <a:solidFill>
+                <a:srgbClr val="C00000"/>
+              </a:solidFill>
+            </a:endParaRPr>
+          </a:p>
+        </p:txBody>
+      </p:sp>
+      <p:pic>
+        <p:nvPicPr>
+          <p:cNvPr id="1028" name="Picture 4" descr="See the source image">
+            <a:extLst>
+              <a:ext uri="{FF2B5EF4-FFF2-40B4-BE49-F238E27FC236}">
+                <a16:creationId xmlns:a16="http://schemas.microsoft.com/office/drawing/2014/main" id="{18258B44-3320-4718-8B70-F30CDDD7BF97}"/>
+              </a:ext>
+            </a:extLst>
+          </p:cNvPr>
+          <p:cNvPicPr>
+            <a:picLocks noChangeAspect="1" noChangeArrowheads="1"/>
+          </p:cNvPicPr>
+          <p:nvPr/>
+        </p:nvPicPr>
+        <p:blipFill>
+          <a:blip r:embed="rId2" cstate="print">
+            <a:extLst>
+              <a:ext uri="{28A0092B-C50C-407E-A947-70E740481C1C}">
+                <a14:useLocalDpi xmlns:a14="http://schemas.microsoft.com/office/drawing/2010/main" val="0"/>
+              </a:ext>
+            </a:extLst>
+          </a:blip>
+          <a:srcRect/>
+          <a:stretch>
+            <a:fillRect/>
+          </a:stretch>
+        </p:blipFill>
+        <p:spPr bwMode="auto">
+          <a:xfrm>
+            <a:off x="1405235" y="2381250"/>
+            <a:ext cx="2095500" cy="2095500"/>
+          </a:xfrm>
+          <a:prstGeom prst="rect">
+            <a:avLst/>
+          </a:prstGeom>
+          <a:noFill/>
+          <a:extLst>
+            <a:ext uri="{909E8E84-426E-40DD-AFC4-6F175D3DCCD1}">
+              <a14:hiddenFill xmlns:a14="http://schemas.microsoft.com/office/drawing/2010/main">
+                <a:solidFill>
+                  <a:srgbClr val="FFFFFF"/>
+                </a:solidFill>
+              </a14:hiddenFill>
+            </a:ext>
+          </a:extLst>
+        </p:spPr>
+      </p:pic>
+      <p:pic>
+        <p:nvPicPr>
+          <p:cNvPr id="1030" name="Picture 6" descr="See the source image">
+            <a:extLst>
+              <a:ext uri="{FF2B5EF4-FFF2-40B4-BE49-F238E27FC236}">
+                <a16:creationId xmlns:a16="http://schemas.microsoft.com/office/drawing/2014/main" id="{2A150278-8641-4182-A4AB-2429FD1AE1B9}"/>
+              </a:ext>
+            </a:extLst>
+          </p:cNvPr>
+          <p:cNvPicPr>
+            <a:picLocks noChangeAspect="1" noChangeArrowheads="1"/>
+          </p:cNvPicPr>
+          <p:nvPr/>
+        </p:nvPicPr>
+        <p:blipFill rotWithShape="1">
+          <a:blip r:embed="rId3" cstate="print">
+            <a:extLst>
+              <a:ext uri="{28A0092B-C50C-407E-A947-70E740481C1C}">
+                <a14:useLocalDpi xmlns:a14="http://schemas.microsoft.com/office/drawing/2010/main" val="0"/>
+              </a:ext>
+            </a:extLst>
+          </a:blip>
+          <a:srcRect l="29687" t="30139" r="29897" b="32083"/>
+          <a:stretch/>
+        </p:blipFill>
+        <p:spPr bwMode="auto">
+          <a:xfrm>
+            <a:off x="4854963" y="2411937"/>
+            <a:ext cx="2624950" cy="1840172"/>
+          </a:xfrm>
+          <a:prstGeom prst="rect">
+            <a:avLst/>
+          </a:prstGeom>
+          <a:noFill/>
+          <a:extLst>
+            <a:ext uri="{909E8E84-426E-40DD-AFC4-6F175D3DCCD1}">
+              <a14:hiddenFill xmlns:a14="http://schemas.microsoft.com/office/drawing/2010/main">
+                <a:solidFill>
+                  <a:srgbClr val="FFFFFF"/>
+                </a:solidFill>
+              </a14:hiddenFill>
+            </a:ext>
+          </a:extLst>
+        </p:spPr>
+      </p:pic>
+      <p:pic>
+        <p:nvPicPr>
+          <p:cNvPr id="1032" name="Picture 8" descr="See the source image">
+            <a:extLst>
+              <a:ext uri="{FF2B5EF4-FFF2-40B4-BE49-F238E27FC236}">
+                <a16:creationId xmlns:a16="http://schemas.microsoft.com/office/drawing/2014/main" id="{2016B9DC-EF29-4357-BA10-C475005953ED}"/>
+              </a:ext>
+            </a:extLst>
+          </p:cNvPr>
+          <p:cNvPicPr>
+            <a:picLocks noChangeAspect="1" noChangeArrowheads="1"/>
+          </p:cNvPicPr>
+          <p:nvPr/>
+        </p:nvPicPr>
+        <p:blipFill>
+          <a:blip r:embed="rId4" cstate="print">
+            <a:extLst>
+              <a:ext uri="{28A0092B-C50C-407E-A947-70E740481C1C}">
+                <a14:useLocalDpi xmlns:a14="http://schemas.microsoft.com/office/drawing/2010/main" val="0"/>
+              </a:ext>
+            </a:extLst>
+          </a:blip>
+          <a:srcRect/>
+          <a:stretch>
+            <a:fillRect/>
+          </a:stretch>
+        </p:blipFill>
+        <p:spPr bwMode="auto">
+          <a:xfrm>
+            <a:off x="8834140" y="2452687"/>
+            <a:ext cx="1952625" cy="1952625"/>
+          </a:xfrm>
+          <a:prstGeom prst="rect">
+            <a:avLst/>
+          </a:prstGeom>
+          <a:noFill/>
+          <a:extLst>
+            <a:ext uri="{909E8E84-426E-40DD-AFC4-6F175D3DCCD1}">
+              <a14:hiddenFill xmlns:a14="http://schemas.microsoft.com/office/drawing/2010/main">
+                <a:solidFill>
+                  <a:srgbClr val="FFFFFF"/>
+                </a:solidFill>
+              </a14:hiddenFill>
+            </a:ext>
+          </a:extLst>
+        </p:spPr>
+      </p:pic>
+    </p:spTree>
+    <p:extLst>
+      <p:ext uri="{BB962C8B-B14F-4D97-AF65-F5344CB8AC3E}">
+        <p14:creationId xmlns:p14="http://schemas.microsoft.com/office/powerpoint/2010/main" val="2986999644"/>
+      </p:ext>
+    </p:extLst>
+  </p:cSld>
+  <p:clrMapOvr>
+    <a:masterClrMapping/>
+  </p:clrMapOvr>
+  <mc:AlternateContent xmlns:mc="http://schemas.openxmlformats.org/markup-compatibility/2006">
+    <mc:Choice xmlns:p14="http://schemas.microsoft.com/office/powerpoint/2010/main" Requires="p14">
+      <p:transition p14:dur="300">
+        <p:fade/>
+      </p:transition>
+    </mc:Choice>
+    <mc:Fallback>
       <p:transition>
         <p:fade/>
       </p:transition>
@@ -28129,13 +28258,13 @@
   <p:clrMapOvr>
     <a:masterClrMapping/>
   </p:clrMapOvr>
-  <mc:AlternateContent xmlns:mc="http://schemas.openxmlformats.org/markup-compatibility/2006" xmlns:p14="http://schemas.microsoft.com/office/powerpoint/2010/main">
-    <mc:Choice Requires="p14">
+  <mc:AlternateContent xmlns:mc="http://schemas.openxmlformats.org/markup-compatibility/2006">
+    <mc:Choice xmlns:p14="http://schemas.microsoft.com/office/powerpoint/2010/main" Requires="p14">
       <p:transition p14:dur="300">
         <p:fade/>
       </p:transition>
     </mc:Choice>
-    <mc:Fallback xmlns="">
+    <mc:Fallback>
       <p:transition>
         <p:fade/>
       </p:transition>
@@ -28462,13 +28591,13 @@
   <p:clrMapOvr>
     <a:masterClrMapping/>
   </p:clrMapOvr>
-  <mc:AlternateContent xmlns:mc="http://schemas.openxmlformats.org/markup-compatibility/2006" xmlns:p14="http://schemas.microsoft.com/office/powerpoint/2010/main">
-    <mc:Choice Requires="p14">
+  <mc:AlternateContent xmlns:mc="http://schemas.openxmlformats.org/markup-compatibility/2006">
+    <mc:Choice xmlns:p14="http://schemas.microsoft.com/office/powerpoint/2010/main" Requires="p14">
       <p:transition p14:dur="300">
         <p:fade/>
       </p:transition>
     </mc:Choice>
-    <mc:Fallback xmlns="">
+    <mc:Fallback>
       <p:transition>
         <p:fade/>
       </p:transition>
@@ -30271,13 +30400,13 @@
   <p:clrMapOvr>
     <a:masterClrMapping/>
   </p:clrMapOvr>
-  <mc:AlternateContent xmlns:mc="http://schemas.openxmlformats.org/markup-compatibility/2006" xmlns:p14="http://schemas.microsoft.com/office/powerpoint/2010/main">
-    <mc:Choice Requires="p14">
+  <mc:AlternateContent xmlns:mc="http://schemas.openxmlformats.org/markup-compatibility/2006">
+    <mc:Choice xmlns:p14="http://schemas.microsoft.com/office/powerpoint/2010/main" Requires="p14">
       <p:transition p14:dur="300">
         <p:fade/>
       </p:transition>
     </mc:Choice>
-    <mc:Fallback xmlns="">
+    <mc:Fallback>
       <p:transition>
         <p:fade/>
       </p:transition>
@@ -30584,13 +30713,13 @@
   <p:clrMapOvr>
     <a:masterClrMapping/>
   </p:clrMapOvr>
-  <mc:AlternateContent xmlns:mc="http://schemas.openxmlformats.org/markup-compatibility/2006" xmlns:p14="http://schemas.microsoft.com/office/powerpoint/2010/main">
-    <mc:Choice Requires="p14">
+  <mc:AlternateContent xmlns:mc="http://schemas.openxmlformats.org/markup-compatibility/2006">
+    <mc:Choice xmlns:p14="http://schemas.microsoft.com/office/powerpoint/2010/main" Requires="p14">
       <p:transition p14:dur="300">
         <p:fade/>
       </p:transition>
     </mc:Choice>
-    <mc:Fallback xmlns="">
+    <mc:Fallback>
       <p:transition>
         <p:fade/>
       </p:transition>
@@ -30750,13 +30879,13 @@
   <p:clrMapOvr>
     <a:masterClrMapping/>
   </p:clrMapOvr>
-  <mc:AlternateContent xmlns:mc="http://schemas.openxmlformats.org/markup-compatibility/2006" xmlns:p14="http://schemas.microsoft.com/office/powerpoint/2010/main">
-    <mc:Choice Requires="p14">
+  <mc:AlternateContent xmlns:mc="http://schemas.openxmlformats.org/markup-compatibility/2006">
+    <mc:Choice xmlns:p14="http://schemas.microsoft.com/office/powerpoint/2010/main" Requires="p14">
       <p:transition p14:dur="300">
         <p:fade/>
       </p:transition>
     </mc:Choice>
-    <mc:Fallback xmlns="">
+    <mc:Fallback>
       <p:transition>
         <p:fade/>
       </p:transition>

</xml_diff>

<commit_message>
Modifications prior to recording part 2 video
</commit_message>
<xml_diff>
--- a/ImageJ_FIJI_Macro_Course_Lecture.pptx
+++ b/ImageJ_FIJI_Macro_Course_Lecture.pptx
@@ -221,7 +221,7 @@
           <a:p>
             <a:fld id="{C0067406-342C-4C89-9F22-12D25B13E586}" type="datetimeFigureOut">
               <a:rPr lang="en-GB" smtClean="0"/>
-              <a:t>26/08/2020</a:t>
+              <a:t>16/04/2021</a:t>
             </a:fld>
             <a:endParaRPr lang="en-GB"/>
           </a:p>
@@ -3148,13 +3148,13 @@
   <p:clrMapOvr>
     <a:masterClrMapping/>
   </p:clrMapOvr>
-  <mc:AlternateContent xmlns:mc="http://schemas.openxmlformats.org/markup-compatibility/2006">
-    <mc:Choice xmlns:p14="http://schemas.microsoft.com/office/powerpoint/2010/main" Requires="p14">
+  <mc:AlternateContent xmlns:mc="http://schemas.openxmlformats.org/markup-compatibility/2006" xmlns:p14="http://schemas.microsoft.com/office/powerpoint/2010/main">
+    <mc:Choice Requires="p14">
       <p:transition p14:dur="300">
         <p:fade/>
       </p:transition>
     </mc:Choice>
-    <mc:Fallback>
+    <mc:Fallback xmlns="">
       <p:transition>
         <p:fade/>
       </p:transition>
@@ -3330,13 +3330,13 @@
   <p:clrMapOvr>
     <a:masterClrMapping/>
   </p:clrMapOvr>
-  <mc:AlternateContent xmlns:mc="http://schemas.openxmlformats.org/markup-compatibility/2006">
-    <mc:Choice xmlns:p14="http://schemas.microsoft.com/office/powerpoint/2010/main" Requires="p14">
+  <mc:AlternateContent xmlns:mc="http://schemas.openxmlformats.org/markup-compatibility/2006" xmlns:p14="http://schemas.microsoft.com/office/powerpoint/2010/main">
+    <mc:Choice Requires="p14">
       <p:transition p14:dur="300">
         <p:fade/>
       </p:transition>
     </mc:Choice>
-    <mc:Fallback>
+    <mc:Fallback xmlns="">
       <p:transition>
         <p:fade/>
       </p:transition>
@@ -3805,13 +3805,13 @@
   <p:clrMapOvr>
     <a:masterClrMapping/>
   </p:clrMapOvr>
-  <mc:AlternateContent xmlns:mc="http://schemas.openxmlformats.org/markup-compatibility/2006">
-    <mc:Choice xmlns:p14="http://schemas.microsoft.com/office/powerpoint/2010/main" Requires="p14">
+  <mc:AlternateContent xmlns:mc="http://schemas.openxmlformats.org/markup-compatibility/2006" xmlns:p14="http://schemas.microsoft.com/office/powerpoint/2010/main">
+    <mc:Choice Requires="p14">
       <p:transition p14:dur="300">
         <p:fade/>
       </p:transition>
     </mc:Choice>
-    <mc:Fallback>
+    <mc:Fallback xmlns="">
       <p:transition>
         <p:fade/>
       </p:transition>
@@ -4244,13 +4244,13 @@
   <p:clrMapOvr>
     <a:masterClrMapping/>
   </p:clrMapOvr>
-  <mc:AlternateContent xmlns:mc="http://schemas.openxmlformats.org/markup-compatibility/2006">
-    <mc:Choice xmlns:p14="http://schemas.microsoft.com/office/powerpoint/2010/main" Requires="p14">
+  <mc:AlternateContent xmlns:mc="http://schemas.openxmlformats.org/markup-compatibility/2006" xmlns:p14="http://schemas.microsoft.com/office/powerpoint/2010/main">
+    <mc:Choice Requires="p14">
       <p:transition p14:dur="300">
         <p:fade/>
       </p:transition>
     </mc:Choice>
-    <mc:Fallback>
+    <mc:Fallback xmlns="">
       <p:transition>
         <p:fade/>
       </p:transition>
@@ -4698,13 +4698,13 @@
   <p:clrMapOvr>
     <a:masterClrMapping/>
   </p:clrMapOvr>
-  <mc:AlternateContent xmlns:mc="http://schemas.openxmlformats.org/markup-compatibility/2006">
-    <mc:Choice xmlns:p14="http://schemas.microsoft.com/office/powerpoint/2010/main" Requires="p14">
+  <mc:AlternateContent xmlns:mc="http://schemas.openxmlformats.org/markup-compatibility/2006" xmlns:p14="http://schemas.microsoft.com/office/powerpoint/2010/main">
+    <mc:Choice Requires="p14">
       <p:transition p14:dur="300">
         <p:fade/>
       </p:transition>
     </mc:Choice>
-    <mc:Fallback>
+    <mc:Fallback xmlns="">
       <p:transition>
         <p:fade/>
       </p:transition>
@@ -5472,13 +5472,13 @@
   <p:clrMapOvr>
     <a:masterClrMapping/>
   </p:clrMapOvr>
-  <mc:AlternateContent xmlns:mc="http://schemas.openxmlformats.org/markup-compatibility/2006">
-    <mc:Choice xmlns:p14="http://schemas.microsoft.com/office/powerpoint/2010/main" Requires="p14">
+  <mc:AlternateContent xmlns:mc="http://schemas.openxmlformats.org/markup-compatibility/2006" xmlns:p14="http://schemas.microsoft.com/office/powerpoint/2010/main">
+    <mc:Choice Requires="p14">
       <p:transition p14:dur="300">
         <p:fade/>
       </p:transition>
     </mc:Choice>
-    <mc:Fallback>
+    <mc:Fallback xmlns="">
       <p:transition>
         <p:fade/>
       </p:transition>
@@ -6622,13 +6622,13 @@
   <p:clrMapOvr>
     <a:masterClrMapping/>
   </p:clrMapOvr>
-  <mc:AlternateContent xmlns:mc="http://schemas.openxmlformats.org/markup-compatibility/2006">
-    <mc:Choice xmlns:p14="http://schemas.microsoft.com/office/powerpoint/2010/main" Requires="p14">
+  <mc:AlternateContent xmlns:mc="http://schemas.openxmlformats.org/markup-compatibility/2006" xmlns:p14="http://schemas.microsoft.com/office/powerpoint/2010/main">
+    <mc:Choice Requires="p14">
       <p:transition p14:dur="300">
         <p:fade/>
       </p:transition>
     </mc:Choice>
-    <mc:Fallback>
+    <mc:Fallback xmlns="">
       <p:transition>
         <p:fade/>
       </p:transition>
@@ -7215,13 +7215,13 @@
   <p:clrMapOvr>
     <a:masterClrMapping/>
   </p:clrMapOvr>
-  <mc:AlternateContent xmlns:mc="http://schemas.openxmlformats.org/markup-compatibility/2006">
-    <mc:Choice xmlns:p14="http://schemas.microsoft.com/office/powerpoint/2010/main" Requires="p14">
+  <mc:AlternateContent xmlns:mc="http://schemas.openxmlformats.org/markup-compatibility/2006" xmlns:p14="http://schemas.microsoft.com/office/powerpoint/2010/main">
+    <mc:Choice Requires="p14">
       <p:transition p14:dur="300">
         <p:fade/>
       </p:transition>
     </mc:Choice>
-    <mc:Fallback>
+    <mc:Fallback xmlns="">
       <p:transition>
         <p:fade/>
       </p:transition>
@@ -7405,13 +7405,13 @@
   <p:clrMapOvr>
     <a:masterClrMapping/>
   </p:clrMapOvr>
-  <mc:AlternateContent xmlns:mc="http://schemas.openxmlformats.org/markup-compatibility/2006">
-    <mc:Choice xmlns:p14="http://schemas.microsoft.com/office/powerpoint/2010/main" Requires="p14">
+  <mc:AlternateContent xmlns:mc="http://schemas.openxmlformats.org/markup-compatibility/2006" xmlns:p14="http://schemas.microsoft.com/office/powerpoint/2010/main">
+    <mc:Choice Requires="p14">
       <p:transition p14:dur="300">
         <p:fade/>
       </p:transition>
     </mc:Choice>
-    <mc:Fallback>
+    <mc:Fallback xmlns="">
       <p:transition>
         <p:fade/>
       </p:transition>
@@ -7838,13 +7838,13 @@
   <p:clrMapOvr>
     <a:masterClrMapping/>
   </p:clrMapOvr>
-  <mc:AlternateContent xmlns:mc="http://schemas.openxmlformats.org/markup-compatibility/2006">
-    <mc:Choice xmlns:p14="http://schemas.microsoft.com/office/powerpoint/2010/main" Requires="p14">
+  <mc:AlternateContent xmlns:mc="http://schemas.openxmlformats.org/markup-compatibility/2006" xmlns:p14="http://schemas.microsoft.com/office/powerpoint/2010/main">
+    <mc:Choice Requires="p14">
       <p:transition p14:dur="300">
         <p:fade/>
       </p:transition>
     </mc:Choice>
-    <mc:Fallback>
+    <mc:Fallback xmlns="">
       <p:transition>
         <p:fade/>
       </p:transition>
@@ -8039,13 +8039,13 @@
   <p:clrMapOvr>
     <a:masterClrMapping/>
   </p:clrMapOvr>
-  <mc:AlternateContent xmlns:mc="http://schemas.openxmlformats.org/markup-compatibility/2006">
-    <mc:Choice xmlns:p14="http://schemas.microsoft.com/office/powerpoint/2010/main" Requires="p14">
+  <mc:AlternateContent xmlns:mc="http://schemas.openxmlformats.org/markup-compatibility/2006" xmlns:p14="http://schemas.microsoft.com/office/powerpoint/2010/main">
+    <mc:Choice Requires="p14">
       <p:transition p14:dur="300">
         <p:fade/>
       </p:transition>
     </mc:Choice>
-    <mc:Fallback>
+    <mc:Fallback xmlns="">
       <p:transition>
         <p:fade/>
       </p:transition>
@@ -8253,13 +8253,13 @@
   <p:clrMapOvr>
     <a:masterClrMapping/>
   </p:clrMapOvr>
-  <mc:AlternateContent xmlns:mc="http://schemas.openxmlformats.org/markup-compatibility/2006">
-    <mc:Choice xmlns:p14="http://schemas.microsoft.com/office/powerpoint/2010/main" Requires="p14">
+  <mc:AlternateContent xmlns:mc="http://schemas.openxmlformats.org/markup-compatibility/2006" xmlns:p14="http://schemas.microsoft.com/office/powerpoint/2010/main">
+    <mc:Choice Requires="p14">
       <p:transition p14:dur="300">
         <p:fade/>
       </p:transition>
     </mc:Choice>
-    <mc:Fallback>
+    <mc:Fallback xmlns="">
       <p:transition>
         <p:fade/>
       </p:transition>
@@ -8428,13 +8428,13 @@
   <p:clrMapOvr>
     <a:masterClrMapping/>
   </p:clrMapOvr>
-  <mc:AlternateContent xmlns:mc="http://schemas.openxmlformats.org/markup-compatibility/2006">
-    <mc:Choice xmlns:p14="http://schemas.microsoft.com/office/powerpoint/2010/main" Requires="p14">
+  <mc:AlternateContent xmlns:mc="http://schemas.openxmlformats.org/markup-compatibility/2006" xmlns:p14="http://schemas.microsoft.com/office/powerpoint/2010/main">
+    <mc:Choice Requires="p14">
       <p:transition p14:dur="300">
         <p:fade/>
       </p:transition>
     </mc:Choice>
-    <mc:Fallback>
+    <mc:Fallback xmlns="">
       <p:transition>
         <p:fade/>
       </p:transition>
@@ -8805,13 +8805,13 @@
   <p:clrMapOvr>
     <a:masterClrMapping/>
   </p:clrMapOvr>
-  <mc:AlternateContent xmlns:mc="http://schemas.openxmlformats.org/markup-compatibility/2006">
-    <mc:Choice xmlns:p14="http://schemas.microsoft.com/office/powerpoint/2010/main" Requires="p14">
+  <mc:AlternateContent xmlns:mc="http://schemas.openxmlformats.org/markup-compatibility/2006" xmlns:p14="http://schemas.microsoft.com/office/powerpoint/2010/main">
+    <mc:Choice Requires="p14">
       <p:transition p14:dur="300">
         <p:fade/>
       </p:transition>
     </mc:Choice>
-    <mc:Fallback>
+    <mc:Fallback xmlns="">
       <p:transition>
         <p:fade/>
       </p:transition>
@@ -9820,13 +9820,13 @@
   <p:clrMapOvr>
     <a:masterClrMapping/>
   </p:clrMapOvr>
-  <mc:AlternateContent xmlns:mc="http://schemas.openxmlformats.org/markup-compatibility/2006">
-    <mc:Choice xmlns:p14="http://schemas.microsoft.com/office/powerpoint/2010/main" Requires="p14">
+  <mc:AlternateContent xmlns:mc="http://schemas.openxmlformats.org/markup-compatibility/2006" xmlns:p14="http://schemas.microsoft.com/office/powerpoint/2010/main">
+    <mc:Choice Requires="p14">
       <p:transition p14:dur="300">
         <p:fade/>
       </p:transition>
     </mc:Choice>
-    <mc:Fallback>
+    <mc:Fallback xmlns="">
       <p:transition>
         <p:fade/>
       </p:transition>
@@ -10685,13 +10685,13 @@
   <p:clrMapOvr>
     <a:masterClrMapping/>
   </p:clrMapOvr>
-  <mc:AlternateContent xmlns:mc="http://schemas.openxmlformats.org/markup-compatibility/2006">
-    <mc:Choice xmlns:p14="http://schemas.microsoft.com/office/powerpoint/2010/main" Requires="p14">
+  <mc:AlternateContent xmlns:mc="http://schemas.openxmlformats.org/markup-compatibility/2006" xmlns:p14="http://schemas.microsoft.com/office/powerpoint/2010/main">
+    <mc:Choice Requires="p14">
       <p:transition p14:dur="300">
         <p:fade/>
       </p:transition>
     </mc:Choice>
-    <mc:Fallback>
+    <mc:Fallback xmlns="">
       <p:transition>
         <p:fade/>
       </p:transition>
@@ -11560,13 +11560,13 @@
   <p:clrMapOvr>
     <a:masterClrMapping/>
   </p:clrMapOvr>
-  <mc:AlternateContent xmlns:mc="http://schemas.openxmlformats.org/markup-compatibility/2006">
-    <mc:Choice xmlns:p14="http://schemas.microsoft.com/office/powerpoint/2010/main" Requires="p14">
+  <mc:AlternateContent xmlns:mc="http://schemas.openxmlformats.org/markup-compatibility/2006" xmlns:p14="http://schemas.microsoft.com/office/powerpoint/2010/main">
+    <mc:Choice Requires="p14">
       <p:transition p14:dur="300">
         <p:fade/>
       </p:transition>
     </mc:Choice>
-    <mc:Fallback>
+    <mc:Fallback xmlns="">
       <p:transition>
         <p:fade/>
       </p:transition>
@@ -12395,13 +12395,13 @@
   <p:clrMapOvr>
     <a:masterClrMapping/>
   </p:clrMapOvr>
-  <mc:AlternateContent xmlns:mc="http://schemas.openxmlformats.org/markup-compatibility/2006">
-    <mc:Choice xmlns:p14="http://schemas.microsoft.com/office/powerpoint/2010/main" Requires="p14">
+  <mc:AlternateContent xmlns:mc="http://schemas.openxmlformats.org/markup-compatibility/2006" xmlns:p14="http://schemas.microsoft.com/office/powerpoint/2010/main">
+    <mc:Choice Requires="p14">
       <p:transition p14:dur="300">
         <p:fade/>
       </p:transition>
     </mc:Choice>
-    <mc:Fallback>
+    <mc:Fallback xmlns="">
       <p:transition>
         <p:fade/>
       </p:transition>
@@ -13046,13 +13046,13 @@
   <p:clrMapOvr>
     <a:masterClrMapping/>
   </p:clrMapOvr>
-  <mc:AlternateContent xmlns:mc="http://schemas.openxmlformats.org/markup-compatibility/2006">
-    <mc:Choice xmlns:p14="http://schemas.microsoft.com/office/powerpoint/2010/main" Requires="p14">
+  <mc:AlternateContent xmlns:mc="http://schemas.openxmlformats.org/markup-compatibility/2006" xmlns:p14="http://schemas.microsoft.com/office/powerpoint/2010/main">
+    <mc:Choice Requires="p14">
       <p:transition p14:dur="300">
         <p:fade/>
       </p:transition>
     </mc:Choice>
-    <mc:Fallback>
+    <mc:Fallback xmlns="">
       <p:transition>
         <p:fade/>
       </p:transition>
@@ -13246,13 +13246,13 @@
   <p:clrMapOvr>
     <a:masterClrMapping/>
   </p:clrMapOvr>
-  <mc:AlternateContent xmlns:mc="http://schemas.openxmlformats.org/markup-compatibility/2006">
-    <mc:Choice xmlns:p14="http://schemas.microsoft.com/office/powerpoint/2010/main" Requires="p14">
+  <mc:AlternateContent xmlns:mc="http://schemas.openxmlformats.org/markup-compatibility/2006" xmlns:p14="http://schemas.microsoft.com/office/powerpoint/2010/main">
+    <mc:Choice Requires="p14">
       <p:transition p14:dur="300">
         <p:fade/>
       </p:transition>
     </mc:Choice>
-    <mc:Fallback>
+    <mc:Fallback xmlns="">
       <p:transition>
         <p:fade/>
       </p:transition>
@@ -13739,13 +13739,13 @@
   <p:clrMapOvr>
     <a:masterClrMapping/>
   </p:clrMapOvr>
-  <mc:AlternateContent xmlns:mc="http://schemas.openxmlformats.org/markup-compatibility/2006">
-    <mc:Choice xmlns:p14="http://schemas.microsoft.com/office/powerpoint/2010/main" Requires="p14">
+  <mc:AlternateContent xmlns:mc="http://schemas.openxmlformats.org/markup-compatibility/2006" xmlns:p14="http://schemas.microsoft.com/office/powerpoint/2010/main">
+    <mc:Choice Requires="p14">
       <p:transition p14:dur="300">
         <p:fade/>
       </p:transition>
     </mc:Choice>
-    <mc:Fallback>
+    <mc:Fallback xmlns="">
       <p:transition>
         <p:fade/>
       </p:transition>
@@ -14230,13 +14230,13 @@
   <p:clrMapOvr>
     <a:masterClrMapping/>
   </p:clrMapOvr>
-  <mc:AlternateContent xmlns:mc="http://schemas.openxmlformats.org/markup-compatibility/2006">
-    <mc:Choice xmlns:p14="http://schemas.microsoft.com/office/powerpoint/2010/main" Requires="p14">
+  <mc:AlternateContent xmlns:mc="http://schemas.openxmlformats.org/markup-compatibility/2006" xmlns:p14="http://schemas.microsoft.com/office/powerpoint/2010/main">
+    <mc:Choice Requires="p14">
       <p:transition p14:dur="300">
         <p:fade/>
       </p:transition>
     </mc:Choice>
-    <mc:Fallback>
+    <mc:Fallback xmlns="">
       <p:transition>
         <p:fade/>
       </p:transition>
@@ -15057,13 +15057,13 @@
   <p:clrMapOvr>
     <a:masterClrMapping/>
   </p:clrMapOvr>
-  <mc:AlternateContent xmlns:mc="http://schemas.openxmlformats.org/markup-compatibility/2006">
-    <mc:Choice xmlns:p14="http://schemas.microsoft.com/office/powerpoint/2010/main" Requires="p14">
+  <mc:AlternateContent xmlns:mc="http://schemas.openxmlformats.org/markup-compatibility/2006" xmlns:p14="http://schemas.microsoft.com/office/powerpoint/2010/main">
+    <mc:Choice Requires="p14">
       <p:transition p14:dur="300">
         <p:fade/>
       </p:transition>
     </mc:Choice>
-    <mc:Fallback>
+    <mc:Fallback xmlns="">
       <p:transition>
         <p:fade/>
       </p:transition>
@@ -16723,13 +16723,13 @@
   <p:clrMapOvr>
     <a:masterClrMapping/>
   </p:clrMapOvr>
-  <mc:AlternateContent xmlns:mc="http://schemas.openxmlformats.org/markup-compatibility/2006">
-    <mc:Choice xmlns:p14="http://schemas.microsoft.com/office/powerpoint/2010/main" Requires="p14">
+  <mc:AlternateContent xmlns:mc="http://schemas.openxmlformats.org/markup-compatibility/2006" xmlns:p14="http://schemas.microsoft.com/office/powerpoint/2010/main">
+    <mc:Choice Requires="p14">
       <p:transition p14:dur="300">
         <p:fade/>
       </p:transition>
     </mc:Choice>
-    <mc:Fallback>
+    <mc:Fallback xmlns="">
       <p:transition>
         <p:fade/>
       </p:transition>
@@ -21644,13 +21644,13 @@
   <p:clrMapOvr>
     <a:masterClrMapping/>
   </p:clrMapOvr>
-  <mc:AlternateContent xmlns:mc="http://schemas.openxmlformats.org/markup-compatibility/2006">
-    <mc:Choice xmlns:p14="http://schemas.microsoft.com/office/powerpoint/2010/main" Requires="p14">
+  <mc:AlternateContent xmlns:mc="http://schemas.openxmlformats.org/markup-compatibility/2006" xmlns:p14="http://schemas.microsoft.com/office/powerpoint/2010/main">
+    <mc:Choice Requires="p14">
       <p:transition p14:dur="300">
         <p:fade/>
       </p:transition>
     </mc:Choice>
-    <mc:Fallback>
+    <mc:Fallback xmlns="">
       <p:transition>
         <p:fade/>
       </p:transition>
@@ -26310,13 +26310,13 @@
   <p:clrMapOvr>
     <a:masterClrMapping/>
   </p:clrMapOvr>
-  <mc:AlternateContent xmlns:mc="http://schemas.openxmlformats.org/markup-compatibility/2006">
-    <mc:Choice xmlns:p14="http://schemas.microsoft.com/office/powerpoint/2010/main" Requires="p14">
+  <mc:AlternateContent xmlns:mc="http://schemas.openxmlformats.org/markup-compatibility/2006" xmlns:p14="http://schemas.microsoft.com/office/powerpoint/2010/main">
+    <mc:Choice Requires="p14">
       <p:transition p14:dur="300">
         <p:fade/>
       </p:transition>
     </mc:Choice>
-    <mc:Fallback>
+    <mc:Fallback xmlns="">
       <p:transition>
         <p:fade/>
       </p:transition>
@@ -26401,13 +26401,13 @@
   <p:clrMapOvr>
     <a:masterClrMapping/>
   </p:clrMapOvr>
-  <mc:AlternateContent xmlns:mc="http://schemas.openxmlformats.org/markup-compatibility/2006">
-    <mc:Choice xmlns:p14="http://schemas.microsoft.com/office/powerpoint/2010/main" Requires="p14">
+  <mc:AlternateContent xmlns:mc="http://schemas.openxmlformats.org/markup-compatibility/2006" xmlns:p14="http://schemas.microsoft.com/office/powerpoint/2010/main">
+    <mc:Choice Requires="p14">
       <p:transition p14:dur="300">
         <p:fade/>
       </p:transition>
     </mc:Choice>
-    <mc:Fallback>
+    <mc:Fallback xmlns="">
       <p:transition>
         <p:fade/>
       </p:transition>
@@ -26508,13 +26508,13 @@
   <p:clrMapOvr>
     <a:masterClrMapping/>
   </p:clrMapOvr>
-  <mc:AlternateContent xmlns:mc="http://schemas.openxmlformats.org/markup-compatibility/2006">
-    <mc:Choice xmlns:p14="http://schemas.microsoft.com/office/powerpoint/2010/main" Requires="p14">
+  <mc:AlternateContent xmlns:mc="http://schemas.openxmlformats.org/markup-compatibility/2006" xmlns:p14="http://schemas.microsoft.com/office/powerpoint/2010/main">
+    <mc:Choice Requires="p14">
       <p:transition p14:dur="300">
         <p:fade/>
       </p:transition>
     </mc:Choice>
-    <mc:Fallback>
+    <mc:Fallback xmlns="">
       <p:transition>
         <p:fade/>
       </p:transition>
@@ -26686,13 +26686,13 @@
   <p:clrMapOvr>
     <a:masterClrMapping/>
   </p:clrMapOvr>
-  <mc:AlternateContent xmlns:mc="http://schemas.openxmlformats.org/markup-compatibility/2006">
-    <mc:Choice xmlns:p14="http://schemas.microsoft.com/office/powerpoint/2010/main" Requires="p14">
+  <mc:AlternateContent xmlns:mc="http://schemas.openxmlformats.org/markup-compatibility/2006" xmlns:p14="http://schemas.microsoft.com/office/powerpoint/2010/main">
+    <mc:Choice Requires="p14">
       <p:transition p14:dur="300">
         <p:fade/>
       </p:transition>
     </mc:Choice>
-    <mc:Fallback>
+    <mc:Fallback xmlns="">
       <p:transition>
         <p:fade/>
       </p:transition>
@@ -26837,13 +26837,13 @@
   <p:clrMapOvr>
     <a:masterClrMapping/>
   </p:clrMapOvr>
-  <mc:AlternateContent xmlns:mc="http://schemas.openxmlformats.org/markup-compatibility/2006">
-    <mc:Choice xmlns:p14="http://schemas.microsoft.com/office/powerpoint/2010/main" Requires="p14">
+  <mc:AlternateContent xmlns:mc="http://schemas.openxmlformats.org/markup-compatibility/2006" xmlns:p14="http://schemas.microsoft.com/office/powerpoint/2010/main">
+    <mc:Choice Requires="p14">
       <p:transition p14:dur="300">
         <p:fade/>
       </p:transition>
     </mc:Choice>
-    <mc:Fallback>
+    <mc:Fallback xmlns="">
       <p:transition>
         <p:fade/>
       </p:transition>
@@ -26903,7 +26903,7 @@
         </p:nvSpPr>
         <p:spPr>
           <a:xfrm>
-            <a:off x="335360" y="1098780"/>
+            <a:off x="335360" y="1196753"/>
             <a:ext cx="11521280" cy="4929411"/>
           </a:xfrm>
         </p:spPr>
@@ -26985,13 +26985,13 @@
   <p:clrMapOvr>
     <a:masterClrMapping/>
   </p:clrMapOvr>
-  <mc:AlternateContent xmlns:mc="http://schemas.openxmlformats.org/markup-compatibility/2006">
-    <mc:Choice xmlns:p14="http://schemas.microsoft.com/office/powerpoint/2010/main" Requires="p14">
+  <mc:AlternateContent xmlns:mc="http://schemas.openxmlformats.org/markup-compatibility/2006" xmlns:p14="http://schemas.microsoft.com/office/powerpoint/2010/main">
+    <mc:Choice Requires="p14">
       <p:transition p14:dur="300">
         <p:fade/>
       </p:transition>
     </mc:Choice>
-    <mc:Fallback>
+    <mc:Fallback xmlns="">
       <p:transition>
         <p:fade/>
       </p:transition>
@@ -27051,7 +27051,7 @@
         </p:nvSpPr>
         <p:spPr>
           <a:xfrm>
-            <a:off x="335360" y="1095156"/>
+            <a:off x="335360" y="1196754"/>
             <a:ext cx="11521280" cy="4929411"/>
           </a:xfrm>
         </p:spPr>
@@ -27123,13 +27123,13 @@
   <p:clrMapOvr>
     <a:masterClrMapping/>
   </p:clrMapOvr>
-  <mc:AlternateContent xmlns:mc="http://schemas.openxmlformats.org/markup-compatibility/2006">
-    <mc:Choice xmlns:p14="http://schemas.microsoft.com/office/powerpoint/2010/main" Requires="p14">
+  <mc:AlternateContent xmlns:mc="http://schemas.openxmlformats.org/markup-compatibility/2006" xmlns:p14="http://schemas.microsoft.com/office/powerpoint/2010/main">
+    <mc:Choice Requires="p14">
       <p:transition p14:dur="300">
         <p:fade/>
       </p:transition>
     </mc:Choice>
-    <mc:Fallback>
+    <mc:Fallback xmlns="">
       <p:transition>
         <p:fade/>
       </p:transition>
@@ -27236,13 +27236,13 @@
   <p:clrMapOvr>
     <a:masterClrMapping/>
   </p:clrMapOvr>
-  <mc:AlternateContent xmlns:mc="http://schemas.openxmlformats.org/markup-compatibility/2006">
-    <mc:Choice xmlns:p14="http://schemas.microsoft.com/office/powerpoint/2010/main" Requires="p14">
+  <mc:AlternateContent xmlns:mc="http://schemas.openxmlformats.org/markup-compatibility/2006" xmlns:p14="http://schemas.microsoft.com/office/powerpoint/2010/main">
+    <mc:Choice Requires="p14">
       <p:transition p14:dur="300">
         <p:fade/>
       </p:transition>
     </mc:Choice>
-    <mc:Fallback>
+    <mc:Fallback xmlns="">
       <p:transition>
         <p:fade/>
       </p:transition>
@@ -27379,13 +27379,13 @@
   <p:clrMapOvr>
     <a:masterClrMapping/>
   </p:clrMapOvr>
-  <mc:AlternateContent xmlns:mc="http://schemas.openxmlformats.org/markup-compatibility/2006">
-    <mc:Choice xmlns:p14="http://schemas.microsoft.com/office/powerpoint/2010/main" Requires="p14">
+  <mc:AlternateContent xmlns:mc="http://schemas.openxmlformats.org/markup-compatibility/2006" xmlns:p14="http://schemas.microsoft.com/office/powerpoint/2010/main">
+    <mc:Choice Requires="p14">
       <p:transition p14:dur="300">
         <p:fade/>
       </p:transition>
     </mc:Choice>
-    <mc:Fallback>
+    <mc:Fallback xmlns="">
       <p:transition>
         <p:fade/>
       </p:transition>
@@ -27488,13 +27488,13 @@
   <p:clrMapOvr>
     <a:masterClrMapping/>
   </p:clrMapOvr>
-  <mc:AlternateContent xmlns:mc="http://schemas.openxmlformats.org/markup-compatibility/2006">
-    <mc:Choice xmlns:p14="http://schemas.microsoft.com/office/powerpoint/2010/main" Requires="p14">
+  <mc:AlternateContent xmlns:mc="http://schemas.openxmlformats.org/markup-compatibility/2006" xmlns:p14="http://schemas.microsoft.com/office/powerpoint/2010/main">
+    <mc:Choice Requires="p14">
       <p:transition p14:dur="300">
         <p:fade/>
       </p:transition>
     </mc:Choice>
-    <mc:Fallback>
+    <mc:Fallback xmlns="">
       <p:transition>
         <p:fade/>
       </p:transition>
@@ -27622,13 +27622,13 @@
   <p:clrMapOvr>
     <a:masterClrMapping/>
   </p:clrMapOvr>
-  <mc:AlternateContent xmlns:mc="http://schemas.openxmlformats.org/markup-compatibility/2006">
-    <mc:Choice xmlns:p14="http://schemas.microsoft.com/office/powerpoint/2010/main" Requires="p14">
+  <mc:AlternateContent xmlns:mc="http://schemas.openxmlformats.org/markup-compatibility/2006" xmlns:p14="http://schemas.microsoft.com/office/powerpoint/2010/main">
+    <mc:Choice Requires="p14">
       <p:transition p14:dur="300">
         <p:fade/>
       </p:transition>
     </mc:Choice>
-    <mc:Fallback>
+    <mc:Fallback xmlns="">
       <p:transition>
         <p:fade/>
       </p:transition>
@@ -27748,13 +27748,13 @@
   <p:clrMapOvr>
     <a:masterClrMapping/>
   </p:clrMapOvr>
-  <mc:AlternateContent xmlns:mc="http://schemas.openxmlformats.org/markup-compatibility/2006">
-    <mc:Choice xmlns:p14="http://schemas.microsoft.com/office/powerpoint/2010/main" Requires="p14">
+  <mc:AlternateContent xmlns:mc="http://schemas.openxmlformats.org/markup-compatibility/2006" xmlns:p14="http://schemas.microsoft.com/office/powerpoint/2010/main">
+    <mc:Choice Requires="p14">
       <p:transition p14:dur="300">
         <p:fade/>
       </p:transition>
     </mc:Choice>
-    <mc:Fallback>
+    <mc:Fallback xmlns="">
       <p:transition>
         <p:fade/>
       </p:transition>
@@ -28106,13 +28106,13 @@
   <p:clrMapOvr>
     <a:masterClrMapping/>
   </p:clrMapOvr>
-  <mc:AlternateContent xmlns:mc="http://schemas.openxmlformats.org/markup-compatibility/2006">
-    <mc:Choice xmlns:p14="http://schemas.microsoft.com/office/powerpoint/2010/main" Requires="p14">
+  <mc:AlternateContent xmlns:mc="http://schemas.openxmlformats.org/markup-compatibility/2006" xmlns:p14="http://schemas.microsoft.com/office/powerpoint/2010/main">
+    <mc:Choice Requires="p14">
       <p:transition p14:dur="300">
         <p:fade/>
       </p:transition>
     </mc:Choice>
-    <mc:Fallback>
+    <mc:Fallback xmlns="">
       <p:transition>
         <p:fade/>
       </p:transition>
@@ -28258,13 +28258,13 @@
   <p:clrMapOvr>
     <a:masterClrMapping/>
   </p:clrMapOvr>
-  <mc:AlternateContent xmlns:mc="http://schemas.openxmlformats.org/markup-compatibility/2006">
-    <mc:Choice xmlns:p14="http://schemas.microsoft.com/office/powerpoint/2010/main" Requires="p14">
+  <mc:AlternateContent xmlns:mc="http://schemas.openxmlformats.org/markup-compatibility/2006" xmlns:p14="http://schemas.microsoft.com/office/powerpoint/2010/main">
+    <mc:Choice Requires="p14">
       <p:transition p14:dur="300">
         <p:fade/>
       </p:transition>
     </mc:Choice>
-    <mc:Fallback>
+    <mc:Fallback xmlns="">
       <p:transition>
         <p:fade/>
       </p:transition>
@@ -28591,13 +28591,13 @@
   <p:clrMapOvr>
     <a:masterClrMapping/>
   </p:clrMapOvr>
-  <mc:AlternateContent xmlns:mc="http://schemas.openxmlformats.org/markup-compatibility/2006">
-    <mc:Choice xmlns:p14="http://schemas.microsoft.com/office/powerpoint/2010/main" Requires="p14">
+  <mc:AlternateContent xmlns:mc="http://schemas.openxmlformats.org/markup-compatibility/2006" xmlns:p14="http://schemas.microsoft.com/office/powerpoint/2010/main">
+    <mc:Choice Requires="p14">
       <p:transition p14:dur="300">
         <p:fade/>
       </p:transition>
     </mc:Choice>
-    <mc:Fallback>
+    <mc:Fallback xmlns="">
       <p:transition>
         <p:fade/>
       </p:transition>
@@ -30400,13 +30400,13 @@
   <p:clrMapOvr>
     <a:masterClrMapping/>
   </p:clrMapOvr>
-  <mc:AlternateContent xmlns:mc="http://schemas.openxmlformats.org/markup-compatibility/2006">
-    <mc:Choice xmlns:p14="http://schemas.microsoft.com/office/powerpoint/2010/main" Requires="p14">
+  <mc:AlternateContent xmlns:mc="http://schemas.openxmlformats.org/markup-compatibility/2006" xmlns:p14="http://schemas.microsoft.com/office/powerpoint/2010/main">
+    <mc:Choice Requires="p14">
       <p:transition p14:dur="300">
         <p:fade/>
       </p:transition>
     </mc:Choice>
-    <mc:Fallback>
+    <mc:Fallback xmlns="">
       <p:transition>
         <p:fade/>
       </p:transition>
@@ -30713,13 +30713,13 @@
   <p:clrMapOvr>
     <a:masterClrMapping/>
   </p:clrMapOvr>
-  <mc:AlternateContent xmlns:mc="http://schemas.openxmlformats.org/markup-compatibility/2006">
-    <mc:Choice xmlns:p14="http://schemas.microsoft.com/office/powerpoint/2010/main" Requires="p14">
+  <mc:AlternateContent xmlns:mc="http://schemas.openxmlformats.org/markup-compatibility/2006" xmlns:p14="http://schemas.microsoft.com/office/powerpoint/2010/main">
+    <mc:Choice Requires="p14">
       <p:transition p14:dur="300">
         <p:fade/>
       </p:transition>
     </mc:Choice>
-    <mc:Fallback>
+    <mc:Fallback xmlns="">
       <p:transition>
         <p:fade/>
       </p:transition>
@@ -30879,13 +30879,13 @@
   <p:clrMapOvr>
     <a:masterClrMapping/>
   </p:clrMapOvr>
-  <mc:AlternateContent xmlns:mc="http://schemas.openxmlformats.org/markup-compatibility/2006">
-    <mc:Choice xmlns:p14="http://schemas.microsoft.com/office/powerpoint/2010/main" Requires="p14">
+  <mc:AlternateContent xmlns:mc="http://schemas.openxmlformats.org/markup-compatibility/2006" xmlns:p14="http://schemas.microsoft.com/office/powerpoint/2010/main">
+    <mc:Choice Requires="p14">
       <p:transition p14:dur="300">
         <p:fade/>
       </p:transition>
     </mc:Choice>
-    <mc:Fallback>
+    <mc:Fallback xmlns="">
       <p:transition>
         <p:fade/>
       </p:transition>

</xml_diff>